<commit_message>
Updated the background and the about slide
</commit_message>
<xml_diff>
--- a/Presentation1.pptx
+++ b/Presentation1.pptx
@@ -5,22 +5,23 @@
     <p:sldMasterId id="2147483648" r:id="rId1"/>
   </p:sldMasterIdLst>
   <p:notesMasterIdLst>
-    <p:notesMasterId r:id="rId12"/>
+    <p:notesMasterId r:id="rId13"/>
   </p:notesMasterIdLst>
   <p:handoutMasterIdLst>
-    <p:handoutMasterId r:id="rId13"/>
+    <p:handoutMasterId r:id="rId14"/>
   </p:handoutMasterIdLst>
   <p:sldIdLst>
     <p:sldId id="256" r:id="rId2"/>
     <p:sldId id="257" r:id="rId3"/>
     <p:sldId id="262" r:id="rId4"/>
     <p:sldId id="263" r:id="rId5"/>
-    <p:sldId id="264" r:id="rId6"/>
-    <p:sldId id="265" r:id="rId7"/>
-    <p:sldId id="268" r:id="rId8"/>
-    <p:sldId id="266" r:id="rId9"/>
-    <p:sldId id="267" r:id="rId10"/>
-    <p:sldId id="259" r:id="rId11"/>
+    <p:sldId id="269" r:id="rId6"/>
+    <p:sldId id="264" r:id="rId7"/>
+    <p:sldId id="265" r:id="rId8"/>
+    <p:sldId id="268" r:id="rId9"/>
+    <p:sldId id="266" r:id="rId10"/>
+    <p:sldId id="267" r:id="rId11"/>
+    <p:sldId id="259" r:id="rId12"/>
   </p:sldIdLst>
   <p:sldSz cx="12192000" cy="6858000"/>
   <p:notesSz cx="6858000" cy="9144000"/>
@@ -1122,7 +1123,7 @@
     </p:spTree>
     <p:extLst>
       <p:ext uri="{BB962C8B-B14F-4D97-AF65-F5344CB8AC3E}">
-        <p14:creationId xmlns:p14="http://schemas.microsoft.com/office/powerpoint/2010/main" val="37198061"/>
+        <p14:creationId xmlns:p14="http://schemas.microsoft.com/office/powerpoint/2010/main" val="1114560398"/>
       </p:ext>
     </p:extLst>
   </p:cSld>
@@ -1244,7 +1245,7 @@
     </p:spTree>
     <p:extLst>
       <p:ext uri="{BB962C8B-B14F-4D97-AF65-F5344CB8AC3E}">
-        <p14:creationId xmlns:p14="http://schemas.microsoft.com/office/powerpoint/2010/main" val="1701539375"/>
+        <p14:creationId xmlns:p14="http://schemas.microsoft.com/office/powerpoint/2010/main" val="37198061"/>
       </p:ext>
     </p:extLst>
   </p:cSld>
@@ -1366,7 +1367,7 @@
     </p:spTree>
     <p:extLst>
       <p:ext uri="{BB962C8B-B14F-4D97-AF65-F5344CB8AC3E}">
-        <p14:creationId xmlns:p14="http://schemas.microsoft.com/office/powerpoint/2010/main" val="1588863158"/>
+        <p14:creationId xmlns:p14="http://schemas.microsoft.com/office/powerpoint/2010/main" val="1701539375"/>
       </p:ext>
     </p:extLst>
   </p:cSld>
@@ -1420,7 +1421,7 @@
           <a:bodyPr/>
           <a:lstStyle/>
           <a:p>
-            <a:endParaRPr lang="en-US" dirty="0"/>
+            <a:endParaRPr lang="en-US"/>
           </a:p>
         </p:txBody>
       </p:sp>
@@ -1488,7 +1489,7 @@
     </p:spTree>
     <p:extLst>
       <p:ext uri="{BB962C8B-B14F-4D97-AF65-F5344CB8AC3E}">
-        <p14:creationId xmlns:p14="http://schemas.microsoft.com/office/powerpoint/2010/main" val="1689546648"/>
+        <p14:creationId xmlns:p14="http://schemas.microsoft.com/office/powerpoint/2010/main" val="1588863158"/>
       </p:ext>
     </p:extLst>
   </p:cSld>
@@ -1564,6 +1565,128 @@
             <a:fld id="{55D4FE3D-D98F-DE42-A28B-16BCEFEC5E71}" type="slidenum">
               <a:rPr lang="en-US" smtClean="0"/>
               <a:t>10</a:t>
+            </a:fld>
+            <a:endParaRPr lang="en-US"/>
+          </a:p>
+        </p:txBody>
+      </p:sp>
+      <p:sp>
+        <p:nvSpPr>
+          <p:cNvPr id="5" name="Footer Placeholder 4"/>
+          <p:cNvSpPr>
+            <a:spLocks noGrp="1"/>
+          </p:cNvSpPr>
+          <p:nvPr>
+            <p:ph type="ftr" sz="quarter" idx="11"/>
+          </p:nvPr>
+        </p:nvSpPr>
+        <p:spPr/>
+        <p:txBody>
+          <a:bodyPr/>
+          <a:lstStyle/>
+          <a:p>
+            <a:endParaRPr lang="en-US"/>
+          </a:p>
+        </p:txBody>
+      </p:sp>
+      <p:sp>
+        <p:nvSpPr>
+          <p:cNvPr id="6" name="Header Placeholder 5"/>
+          <p:cNvSpPr>
+            <a:spLocks noGrp="1"/>
+          </p:cNvSpPr>
+          <p:nvPr>
+            <p:ph type="hdr" sz="quarter" idx="12"/>
+          </p:nvPr>
+        </p:nvSpPr>
+        <p:spPr/>
+        <p:txBody>
+          <a:bodyPr/>
+          <a:lstStyle/>
+          <a:p>
+            <a:endParaRPr lang="en-US"/>
+          </a:p>
+        </p:txBody>
+      </p:sp>
+    </p:spTree>
+    <p:extLst>
+      <p:ext uri="{BB962C8B-B14F-4D97-AF65-F5344CB8AC3E}">
+        <p14:creationId xmlns:p14="http://schemas.microsoft.com/office/powerpoint/2010/main" val="1689546648"/>
+      </p:ext>
+    </p:extLst>
+  </p:cSld>
+  <p:clrMapOvr>
+    <a:masterClrMapping/>
+  </p:clrMapOvr>
+</p:notes>
+</file>
+
+<file path=ppt/notesSlides/notesSlide9.xml><?xml version="1.0" encoding="utf-8"?>
+<p:notes xmlns:a="http://schemas.openxmlformats.org/drawingml/2006/main" xmlns:r="http://schemas.openxmlformats.org/officeDocument/2006/relationships" xmlns:p="http://schemas.openxmlformats.org/presentationml/2006/main">
+  <p:cSld>
+    <p:spTree>
+      <p:nvGrpSpPr>
+        <p:cNvPr id="1" name=""/>
+        <p:cNvGrpSpPr/>
+        <p:nvPr/>
+      </p:nvGrpSpPr>
+      <p:grpSpPr>
+        <a:xfrm>
+          <a:off x="0" y="0"/>
+          <a:ext cx="0" cy="0"/>
+          <a:chOff x="0" y="0"/>
+          <a:chExt cx="0" cy="0"/>
+        </a:xfrm>
+      </p:grpSpPr>
+      <p:sp>
+        <p:nvSpPr>
+          <p:cNvPr id="2" name="Slide Image Placeholder 1"/>
+          <p:cNvSpPr>
+            <a:spLocks noGrp="1" noRot="1" noChangeAspect="1"/>
+          </p:cNvSpPr>
+          <p:nvPr>
+            <p:ph type="sldImg"/>
+          </p:nvPr>
+        </p:nvSpPr>
+        <p:spPr/>
+      </p:sp>
+      <p:sp>
+        <p:nvSpPr>
+          <p:cNvPr id="3" name="Notes Placeholder 2"/>
+          <p:cNvSpPr>
+            <a:spLocks noGrp="1"/>
+          </p:cNvSpPr>
+          <p:nvPr>
+            <p:ph type="body" idx="1"/>
+          </p:nvPr>
+        </p:nvSpPr>
+        <p:spPr/>
+        <p:txBody>
+          <a:bodyPr/>
+          <a:lstStyle/>
+          <a:p>
+            <a:endParaRPr lang="en-US" dirty="0"/>
+          </a:p>
+        </p:txBody>
+      </p:sp>
+      <p:sp>
+        <p:nvSpPr>
+          <p:cNvPr id="4" name="Slide Number Placeholder 3"/>
+          <p:cNvSpPr>
+            <a:spLocks noGrp="1"/>
+          </p:cNvSpPr>
+          <p:nvPr>
+            <p:ph type="sldNum" sz="quarter" idx="10"/>
+          </p:nvPr>
+        </p:nvSpPr>
+        <p:spPr/>
+        <p:txBody>
+          <a:bodyPr/>
+          <a:lstStyle/>
+          <a:p>
+            <a:fld id="{55D4FE3D-D98F-DE42-A28B-16BCEFEC5E71}" type="slidenum">
+              <a:rPr lang="en-US" smtClean="0"/>
+              <a:t>11</a:t>
             </a:fld>
             <a:endParaRPr lang="en-US"/>
           </a:p>
@@ -4522,20 +4645,7 @@
                   </a:outerShdw>
                 </a:effectLst>
               </a:rPr>
-              <a:t>The Diagonal Argument and Algorithm </a:t>
-            </a:r>
-            <a:r>
-              <a:rPr lang="en-US" dirty="0" smtClean="0">
-                <a:solidFill>
-                  <a:schemeClr val="bg1"/>
-                </a:solidFill>
-                <a:effectLst>
-                  <a:outerShdw blurRad="50800" dist="50800" dir="5400000" algn="ctr" rotWithShape="0">
-                    <a:srgbClr val="000000"/>
-                  </a:outerShdw>
-                </a:effectLst>
-              </a:rPr>
-              <a:t>W</a:t>
+              <a:t>The Diagonal Argument and Algorithm W</a:t>
             </a:r>
             <a:endParaRPr lang="en-US" dirty="0">
               <a:solidFill>
@@ -4607,6 +4717,178 @@
 </file>
 
 <file path=ppt/slides/slide10.xml><?xml version="1.0" encoding="utf-8"?>
+<p:sld xmlns:a="http://schemas.openxmlformats.org/drawingml/2006/main" xmlns:r="http://schemas.openxmlformats.org/officeDocument/2006/relationships" xmlns:p="http://schemas.openxmlformats.org/presentationml/2006/main">
+  <p:cSld>
+    <p:bg>
+      <p:bgPr>
+        <a:solidFill>
+          <a:schemeClr val="bg1"/>
+        </a:solidFill>
+        <a:effectLst/>
+      </p:bgPr>
+    </p:bg>
+    <p:spTree>
+      <p:nvGrpSpPr>
+        <p:cNvPr id="1" name=""/>
+        <p:cNvGrpSpPr/>
+        <p:nvPr/>
+      </p:nvGrpSpPr>
+      <p:grpSpPr>
+        <a:xfrm>
+          <a:off x="0" y="0"/>
+          <a:ext cx="0" cy="0"/>
+          <a:chOff x="0" y="0"/>
+          <a:chExt cx="0" cy="0"/>
+        </a:xfrm>
+      </p:grpSpPr>
+      <p:sp>
+        <p:nvSpPr>
+          <p:cNvPr id="2" name="Title 1"/>
+          <p:cNvSpPr>
+            <a:spLocks noGrp="1"/>
+          </p:cNvSpPr>
+          <p:nvPr>
+            <p:ph type="title"/>
+          </p:nvPr>
+        </p:nvSpPr>
+        <p:spPr>
+          <a:xfrm>
+            <a:off x="1312334" y="109537"/>
+            <a:ext cx="10515600" cy="1325563"/>
+          </a:xfrm>
+        </p:spPr>
+        <p:txBody>
+          <a:bodyPr/>
+          <a:lstStyle/>
+          <a:p>
+            <a:r>
+              <a:rPr lang="en-US" dirty="0" smtClean="0"/>
+              <a:t>Has this proof been explored before</a:t>
+            </a:r>
+            <a:r>
+              <a:rPr lang="mr-IN" dirty="0" smtClean="0"/>
+              <a:t>…</a:t>
+            </a:r>
+            <a:r>
+              <a:rPr lang="en-US" dirty="0" smtClean="0"/>
+              <a:t> yes</a:t>
+            </a:r>
+            <a:endParaRPr lang="en-US" dirty="0"/>
+          </a:p>
+        </p:txBody>
+      </p:sp>
+      <p:sp>
+        <p:nvSpPr>
+          <p:cNvPr id="3" name="Content Placeholder 2"/>
+          <p:cNvSpPr>
+            <a:spLocks noGrp="1"/>
+          </p:cNvSpPr>
+          <p:nvPr>
+            <p:ph idx="1"/>
+          </p:nvPr>
+        </p:nvSpPr>
+        <p:spPr/>
+        <p:txBody>
+          <a:bodyPr/>
+          <a:lstStyle/>
+          <a:p>
+            <a:endParaRPr lang="en-US" dirty="0"/>
+          </a:p>
+          <a:p>
+            <a:endParaRPr lang="en-US" dirty="0"/>
+          </a:p>
+        </p:txBody>
+      </p:sp>
+      <p:sp>
+        <p:nvSpPr>
+          <p:cNvPr id="4" name="Slide Number Placeholder 3"/>
+          <p:cNvSpPr>
+            <a:spLocks noGrp="1"/>
+          </p:cNvSpPr>
+          <p:nvPr>
+            <p:ph type="sldNum" sz="quarter" idx="12"/>
+          </p:nvPr>
+        </p:nvSpPr>
+        <p:spPr/>
+        <p:txBody>
+          <a:bodyPr/>
+          <a:lstStyle/>
+          <a:p>
+            <a:fld id="{0AA1573F-8A70-3048-8CDE-BD6505795BEA}" type="slidenum">
+              <a:rPr lang="en-US" smtClean="0"/>
+              <a:t>11</a:t>
+            </a:fld>
+            <a:endParaRPr lang="en-US"/>
+          </a:p>
+        </p:txBody>
+      </p:sp>
+      <p:sp>
+        <p:nvSpPr>
+          <p:cNvPr id="5" name="Footer Placeholder 4"/>
+          <p:cNvSpPr>
+            <a:spLocks noGrp="1"/>
+          </p:cNvSpPr>
+          <p:nvPr>
+            <p:ph type="ftr" sz="quarter" idx="11"/>
+          </p:nvPr>
+        </p:nvSpPr>
+        <p:spPr/>
+        <p:txBody>
+          <a:bodyPr/>
+          <a:lstStyle/>
+          <a:p>
+            <a:r>
+              <a:rPr lang="en-US" smtClean="0"/>
+              <a:t>test</a:t>
+            </a:r>
+            <a:endParaRPr lang="en-US"/>
+          </a:p>
+        </p:txBody>
+      </p:sp>
+      <p:pic>
+        <p:nvPicPr>
+          <p:cNvPr id="7" name="Picture 6"/>
+          <p:cNvPicPr>
+            <a:picLocks noChangeAspect="1"/>
+          </p:cNvPicPr>
+          <p:nvPr/>
+        </p:nvPicPr>
+        <p:blipFill>
+          <a:blip r:embed="rId3">
+            <a:extLst>
+              <a:ext uri="{28A0092B-C50C-407E-A947-70E740481C1C}">
+                <a14:useLocalDpi xmlns:a14="http://schemas.microsoft.com/office/drawing/2010/main" val="0"/>
+              </a:ext>
+            </a:extLst>
+          </a:blip>
+          <a:stretch>
+            <a:fillRect/>
+          </a:stretch>
+        </p:blipFill>
+        <p:spPr>
+          <a:xfrm>
+            <a:off x="1532467" y="1317181"/>
+            <a:ext cx="8678333" cy="5794819"/>
+          </a:xfrm>
+          <a:prstGeom prst="rect">
+            <a:avLst/>
+          </a:prstGeom>
+        </p:spPr>
+      </p:pic>
+    </p:spTree>
+    <p:extLst>
+      <p:ext uri="{BB962C8B-B14F-4D97-AF65-F5344CB8AC3E}">
+        <p14:creationId xmlns:p14="http://schemas.microsoft.com/office/powerpoint/2010/main" val="1783135862"/>
+      </p:ext>
+    </p:extLst>
+  </p:cSld>
+  <p:clrMapOvr>
+    <a:masterClrMapping/>
+  </p:clrMapOvr>
+</p:sld>
+</file>
+
+<file path=ppt/slides/slide11.xml><?xml version="1.0" encoding="utf-8"?>
 <p:sld xmlns:a="http://schemas.openxmlformats.org/drawingml/2006/main" xmlns:r="http://schemas.openxmlformats.org/officeDocument/2006/relationships" xmlns:p="http://schemas.openxmlformats.org/presentationml/2006/main">
   <p:cSld>
     <p:bg>
@@ -4705,30 +4987,9 @@
   <p:cSld>
     <p:bg>
       <p:bgPr>
-        <a:gradFill flip="none" rotWithShape="1">
-          <a:gsLst>
-            <a:gs pos="0">
-              <a:srgbClr val="799EB8"/>
-            </a:gs>
-            <a:gs pos="42000">
-              <a:schemeClr val="accent1">
-                <a:lumMod val="45000"/>
-                <a:lumOff val="55000"/>
-              </a:schemeClr>
-            </a:gs>
-            <a:gs pos="42000">
-              <a:schemeClr val="accent1">
-                <a:lumMod val="45000"/>
-                <a:lumOff val="55000"/>
-              </a:schemeClr>
-            </a:gs>
-            <a:gs pos="100000">
-              <a:srgbClr val="DF718A"/>
-            </a:gs>
-          </a:gsLst>
-          <a:lin ang="18900000" scaled="1"/>
-          <a:tileRect/>
-        </a:gradFill>
+        <a:solidFill>
+          <a:schemeClr val="bg1"/>
+        </a:solidFill>
         <a:effectLst/>
       </p:bgPr>
     </p:bg>
@@ -4804,7 +5065,62 @@
               <a:rPr lang="en-US" dirty="0" smtClean="0"/>
               <a:t>I am doing this because I am just interested in Computer Science and functional programming.</a:t>
             </a:r>
+          </a:p>
+          <a:p>
+            <a:endParaRPr lang="en-US" dirty="0"/>
+          </a:p>
+          <a:p>
+            <a:r>
+              <a:rPr lang="en-US" dirty="0" err="1" smtClean="0"/>
+              <a:t>Github</a:t>
+            </a:r>
+            <a:r>
+              <a:rPr lang="en-US" dirty="0" smtClean="0"/>
+              <a:t>: </a:t>
+            </a:r>
+            <a:r>
+              <a:rPr lang="en-US" dirty="0">
+                <a:hlinkClick r:id="rId3"/>
+              </a:rPr>
+              <a:t>https://</a:t>
+            </a:r>
+            <a:r>
+              <a:rPr lang="en-US" dirty="0" smtClean="0">
+                <a:hlinkClick r:id="rId3"/>
+              </a:rPr>
+              <a:t>github.com/seanwestfall</a:t>
+            </a:r>
             <a:endParaRPr lang="en-US" dirty="0" smtClean="0"/>
+          </a:p>
+          <a:p>
+            <a:r>
+              <a:rPr lang="en-US" dirty="0" smtClean="0"/>
+              <a:t>Twitter: </a:t>
+            </a:r>
+            <a:r>
+              <a:rPr lang="en-US" dirty="0">
+                <a:hlinkClick r:id="rId4"/>
+              </a:rPr>
+              <a:t>https://</a:t>
+            </a:r>
+            <a:r>
+              <a:rPr lang="en-US" dirty="0" smtClean="0">
+                <a:hlinkClick r:id="rId4"/>
+              </a:rPr>
+              <a:t>twitter.com/alphonse86</a:t>
+            </a:r>
+            <a:endParaRPr lang="en-US" dirty="0" smtClean="0"/>
+          </a:p>
+          <a:p>
+            <a:r>
+              <a:rPr lang="en-US" dirty="0" smtClean="0"/>
+              <a:t>Personal Website: </a:t>
+            </a:r>
+            <a:r>
+              <a:rPr lang="en-US" dirty="0" err="1" smtClean="0"/>
+              <a:t>fieldsofgoldfi.sh</a:t>
+            </a:r>
+            <a:endParaRPr lang="en-US" dirty="0"/>
           </a:p>
         </p:txBody>
       </p:sp>
@@ -4872,30 +5188,9 @@
   <p:cSld>
     <p:bg>
       <p:bgPr>
-        <a:gradFill flip="none" rotWithShape="1">
-          <a:gsLst>
-            <a:gs pos="0">
-              <a:srgbClr val="799EB8"/>
-            </a:gs>
-            <a:gs pos="42000">
-              <a:schemeClr val="accent1">
-                <a:lumMod val="45000"/>
-                <a:lumOff val="55000"/>
-              </a:schemeClr>
-            </a:gs>
-            <a:gs pos="42000">
-              <a:schemeClr val="accent1">
-                <a:lumMod val="45000"/>
-                <a:lumOff val="55000"/>
-              </a:schemeClr>
-            </a:gs>
-            <a:gs pos="100000">
-              <a:srgbClr val="DF718A"/>
-            </a:gs>
-          </a:gsLst>
-          <a:lin ang="18900000" scaled="1"/>
-          <a:tileRect/>
-        </a:gradFill>
+        <a:solidFill>
+          <a:schemeClr val="bg1"/>
+        </a:solidFill>
         <a:effectLst/>
       </p:bgPr>
     </p:bg>
@@ -5036,30 +5331,9 @@
   <p:cSld>
     <p:bg>
       <p:bgPr>
-        <a:gradFill flip="none" rotWithShape="1">
-          <a:gsLst>
-            <a:gs pos="0">
-              <a:srgbClr val="799EB8"/>
-            </a:gs>
-            <a:gs pos="42000">
-              <a:schemeClr val="accent1">
-                <a:lumMod val="45000"/>
-                <a:lumOff val="55000"/>
-              </a:schemeClr>
-            </a:gs>
-            <a:gs pos="42000">
-              <a:schemeClr val="accent1">
-                <a:lumMod val="45000"/>
-                <a:lumOff val="55000"/>
-              </a:schemeClr>
-            </a:gs>
-            <a:gs pos="100000">
-              <a:srgbClr val="DF718A"/>
-            </a:gs>
-          </a:gsLst>
-          <a:lin ang="18900000" scaled="1"/>
-          <a:tileRect/>
-        </a:gradFill>
+        <a:solidFill>
+          <a:schemeClr val="bg1"/>
+        </a:solidFill>
         <a:effectLst/>
       </p:bgPr>
     </p:bg>
@@ -5216,30 +5490,9 @@
   <p:cSld>
     <p:bg>
       <p:bgPr>
-        <a:gradFill flip="none" rotWithShape="1">
-          <a:gsLst>
-            <a:gs pos="0">
-              <a:srgbClr val="799EB8"/>
-            </a:gs>
-            <a:gs pos="42000">
-              <a:schemeClr val="accent1">
-                <a:lumMod val="45000"/>
-                <a:lumOff val="55000"/>
-              </a:schemeClr>
-            </a:gs>
-            <a:gs pos="42000">
-              <a:schemeClr val="accent1">
-                <a:lumMod val="45000"/>
-                <a:lumOff val="55000"/>
-              </a:schemeClr>
-            </a:gs>
-            <a:gs pos="100000">
-              <a:srgbClr val="DF718A"/>
-            </a:gs>
-          </a:gsLst>
-          <a:lin ang="18900000" scaled="1"/>
-          <a:tileRect/>
-        </a:gradFill>
+        <a:solidFill>
+          <a:schemeClr val="bg1"/>
+        </a:solidFill>
         <a:effectLst/>
       </p:bgPr>
     </p:bg>
@@ -5259,7 +5512,7 @@
       </p:grpSpPr>
       <p:sp>
         <p:nvSpPr>
-          <p:cNvPr id="2" name="Title 1"/>
+          <p:cNvPr id="7" name="Title 6"/>
           <p:cNvSpPr>
             <a:spLocks noGrp="1"/>
           </p:cNvSpPr>
@@ -5272,29 +5525,13 @@
           <a:bodyPr/>
           <a:lstStyle/>
           <a:p>
-            <a:r>
-              <a:rPr lang="en-US" dirty="0" err="1" smtClean="0"/>
-              <a:t>Unitification</a:t>
-            </a:r>
-            <a:r>
-              <a:rPr lang="en-US" dirty="0" smtClean="0"/>
-              <a:t> (</a:t>
-            </a:r>
-            <a:r>
-              <a:rPr lang="en-US" dirty="0" err="1" smtClean="0"/>
-              <a:t>pesudo</a:t>
-            </a:r>
-            <a:r>
-              <a:rPr lang="en-US" dirty="0" smtClean="0"/>
-              <a:t> code)</a:t>
-            </a:r>
-            <a:endParaRPr lang="en-US" dirty="0"/>
-          </a:p>
-        </p:txBody>
-      </p:sp>
-      <p:sp>
-        <p:nvSpPr>
-          <p:cNvPr id="3" name="Content Placeholder 2"/>
+            <a:endParaRPr lang="en-US"/>
+          </a:p>
+        </p:txBody>
+      </p:sp>
+      <p:sp>
+        <p:nvSpPr>
+          <p:cNvPr id="8" name="Content Placeholder 7"/>
           <p:cNvSpPr>
             <a:spLocks noGrp="1"/>
           </p:cNvSpPr>
@@ -5304,296 +5541,70 @@
         </p:nvSpPr>
         <p:spPr/>
         <p:txBody>
-          <a:bodyPr/>
-          <a:lstStyle/>
-          <a:p>
-            <a:endParaRPr lang="en-US" dirty="0"/>
-          </a:p>
-          <a:p>
-            <a:endParaRPr lang="en-US" dirty="0"/>
-          </a:p>
-        </p:txBody>
-      </p:sp>
-      <p:sp>
-        <p:nvSpPr>
-          <p:cNvPr id="4" name="Slide Number Placeholder 3"/>
-          <p:cNvSpPr>
-            <a:spLocks noGrp="1"/>
-          </p:cNvSpPr>
-          <p:nvPr>
-            <p:ph type="sldNum" sz="quarter" idx="12"/>
-          </p:nvPr>
-        </p:nvSpPr>
-        <p:spPr/>
-        <p:txBody>
-          <a:bodyPr/>
-          <a:lstStyle/>
-          <a:p>
-            <a:fld id="{0AA1573F-8A70-3048-8CDE-BD6505795BEA}" type="slidenum">
-              <a:rPr lang="en-US" smtClean="0"/>
-              <a:t>6</a:t>
-            </a:fld>
-            <a:endParaRPr lang="en-US"/>
-          </a:p>
-        </p:txBody>
-      </p:sp>
-      <p:sp>
-        <p:nvSpPr>
-          <p:cNvPr id="5" name="Footer Placeholder 4"/>
-          <p:cNvSpPr>
-            <a:spLocks noGrp="1"/>
-          </p:cNvSpPr>
-          <p:nvPr>
-            <p:ph type="ftr" sz="quarter" idx="11"/>
-          </p:nvPr>
-        </p:nvSpPr>
-        <p:spPr/>
-        <p:txBody>
-          <a:bodyPr/>
-          <a:lstStyle/>
-          <a:p>
-            <a:r>
-              <a:rPr lang="en-US" smtClean="0"/>
-              <a:t>test</a:t>
-            </a:r>
-            <a:endParaRPr lang="en-US"/>
-          </a:p>
-        </p:txBody>
-      </p:sp>
-      <p:sp>
-        <p:nvSpPr>
-          <p:cNvPr id="7" name="TextBox 6"/>
-          <p:cNvSpPr txBox="1"/>
-          <p:nvPr/>
-        </p:nvSpPr>
-        <p:spPr>
-          <a:xfrm>
-            <a:off x="838200" y="1473201"/>
-            <a:ext cx="10885714" cy="2031325"/>
-          </a:xfrm>
-          <a:prstGeom prst="rect">
-            <a:avLst/>
-          </a:prstGeom>
-          <a:noFill/>
-        </p:spPr>
-        <p:txBody>
-          <a:bodyPr wrap="square" rtlCol="0">
-            <a:spAutoFit/>
+          <a:bodyPr>
+            <a:normAutofit/>
           </a:bodyPr>
           <a:lstStyle/>
           <a:p>
             <a:r>
-              <a:rPr lang="en-US" dirty="0"/>
-              <a:t>unify(</a:t>
-            </a:r>
-            <a:r>
-              <a:rPr lang="en-US" dirty="0" err="1"/>
-              <a:t>ta,tb</a:t>
-            </a:r>
-            <a:r>
-              <a:rPr lang="en-US" dirty="0"/>
-              <a:t>): ta = find(ta) </a:t>
-            </a:r>
-            <a:r>
-              <a:rPr lang="en-US" dirty="0" err="1"/>
-              <a:t>tb</a:t>
-            </a:r>
-            <a:r>
-              <a:rPr lang="en-US" dirty="0"/>
-              <a:t> = find(</a:t>
-            </a:r>
-            <a:r>
-              <a:rPr lang="en-US" dirty="0" err="1"/>
-              <a:t>tb</a:t>
-            </a:r>
-            <a:r>
-              <a:rPr lang="en-US" dirty="0"/>
-              <a:t>) </a:t>
-            </a:r>
-            <a:endParaRPr lang="en-US" dirty="0" smtClean="0"/>
-          </a:p>
-          <a:p>
-            <a:r>
-              <a:rPr lang="en-US" b="1" dirty="0"/>
-              <a:t>	</a:t>
-            </a:r>
-            <a:r>
-              <a:rPr lang="en-US" b="1" dirty="0" smtClean="0"/>
-              <a:t>if</a:t>
-            </a:r>
-            <a:r>
-              <a:rPr lang="en-US" dirty="0" smtClean="0"/>
+              <a:rPr lang="en-US" sz="4000" u="sng" dirty="0" smtClean="0"/>
+              <a:t>x :</a:t>
+            </a:r>
+            <a:r>
+              <a:rPr lang="en-US" sz="4000" u="sng" dirty="0" err="1" smtClean="0"/>
+              <a:t>ß</a:t>
+            </a:r>
+            <a:r>
+              <a:rPr lang="en-US" sz="4000" u="sng" dirty="0" smtClean="0"/>
               <a:t> </a:t>
             </a:r>
             <a:r>
-              <a:rPr lang="en-US" dirty="0"/>
-              <a:t>both </a:t>
-            </a:r>
-            <a:r>
-              <a:rPr lang="en-US" dirty="0" err="1"/>
-              <a:t>ta,tb</a:t>
-            </a:r>
-            <a:r>
-              <a:rPr lang="en-US" dirty="0"/>
-              <a:t> are terms of the form D p1..pn with identical </a:t>
-            </a:r>
-            <a:r>
-              <a:rPr lang="en-US" dirty="0" err="1"/>
-              <a:t>D,n</a:t>
-            </a:r>
-            <a:r>
-              <a:rPr lang="en-US" dirty="0"/>
-              <a:t> </a:t>
-            </a:r>
-            <a:endParaRPr lang="en-US" dirty="0" smtClean="0"/>
-          </a:p>
-          <a:p>
-            <a:r>
-              <a:rPr lang="en-US" b="1" dirty="0"/>
-              <a:t>	</a:t>
-            </a:r>
-            <a:r>
-              <a:rPr lang="en-US" b="1" dirty="0" smtClean="0"/>
-              <a:t>	then</a:t>
-            </a:r>
-            <a:r>
-              <a:rPr lang="en-US" dirty="0" smtClean="0"/>
-              <a:t> </a:t>
-            </a:r>
-            <a:r>
-              <a:rPr lang="en-US" dirty="0"/>
-              <a:t>unify(ta[</a:t>
-            </a:r>
-            <a:r>
-              <a:rPr lang="en-US" dirty="0" err="1"/>
-              <a:t>i</a:t>
-            </a:r>
-            <a:r>
-              <a:rPr lang="en-US" dirty="0"/>
-              <a:t>],</a:t>
-            </a:r>
-            <a:r>
-              <a:rPr lang="en-US" dirty="0" err="1"/>
-              <a:t>tb</a:t>
-            </a:r>
-            <a:r>
-              <a:rPr lang="en-US" dirty="0"/>
-              <a:t>[</a:t>
-            </a:r>
-            <a:r>
-              <a:rPr lang="en-US" dirty="0" err="1"/>
-              <a:t>i</a:t>
-            </a:r>
-            <a:r>
-              <a:rPr lang="en-US" dirty="0"/>
-              <a:t>]) for each corresponding </a:t>
-            </a:r>
-            <a:r>
-              <a:rPr lang="en-US" i="1" dirty="0" err="1"/>
-              <a:t>i</a:t>
-            </a:r>
-            <a:r>
-              <a:rPr lang="en-US" dirty="0" err="1"/>
-              <a:t>th</a:t>
-            </a:r>
-            <a:r>
-              <a:rPr lang="en-US" dirty="0"/>
-              <a:t> parameter </a:t>
-            </a:r>
-            <a:endParaRPr lang="en-US" dirty="0" smtClean="0"/>
-          </a:p>
-          <a:p>
-            <a:r>
-              <a:rPr lang="en-US" b="1" dirty="0"/>
-              <a:t>	</a:t>
-            </a:r>
-            <a:r>
-              <a:rPr lang="en-US" b="1" dirty="0" smtClean="0"/>
-              <a:t>else</a:t>
-            </a:r>
-            <a:r>
-              <a:rPr lang="en-US" dirty="0" smtClean="0"/>
-              <a:t> </a:t>
-            </a:r>
-            <a:r>
-              <a:rPr lang="en-US" b="1" dirty="0"/>
-              <a:t>if</a:t>
-            </a:r>
-            <a:r>
-              <a:rPr lang="en-US" dirty="0"/>
-              <a:t> at least one of </a:t>
-            </a:r>
-            <a:r>
-              <a:rPr lang="en-US" dirty="0" err="1"/>
-              <a:t>ta,tb</a:t>
-            </a:r>
-            <a:r>
-              <a:rPr lang="en-US" dirty="0"/>
-              <a:t> is a type </a:t>
-            </a:r>
-            <a:r>
-              <a:rPr lang="en-US" dirty="0" smtClean="0"/>
-              <a:t>variable</a:t>
-            </a:r>
-          </a:p>
-          <a:p>
-            <a:r>
-              <a:rPr lang="en-US" dirty="0"/>
-              <a:t>	</a:t>
-            </a:r>
-            <a:r>
-              <a:rPr lang="en-US" dirty="0" smtClean="0"/>
-              <a:t>	</a:t>
-            </a:r>
-            <a:r>
-              <a:rPr lang="en-US" b="1" dirty="0" smtClean="0"/>
-              <a:t>then</a:t>
-            </a:r>
-            <a:r>
-              <a:rPr lang="en-US" dirty="0" smtClean="0"/>
-              <a:t> </a:t>
-            </a:r>
-            <a:r>
-              <a:rPr lang="en-US" dirty="0"/>
-              <a:t>union(</a:t>
-            </a:r>
-            <a:r>
-              <a:rPr lang="en-US" dirty="0" err="1"/>
-              <a:t>ta,tb</a:t>
-            </a:r>
-            <a:r>
-              <a:rPr lang="en-US" dirty="0"/>
-              <a:t>) </a:t>
-            </a:r>
-            <a:endParaRPr lang="en-US" dirty="0" smtClean="0"/>
-          </a:p>
-          <a:p>
-            <a:r>
-              <a:rPr lang="en-US" b="1" dirty="0"/>
-              <a:t>	</a:t>
-            </a:r>
-            <a:r>
-              <a:rPr lang="en-US" b="1" dirty="0" smtClean="0"/>
-              <a:t>else</a:t>
-            </a:r>
-            <a:r>
-              <a:rPr lang="en-US" dirty="0" smtClean="0"/>
-              <a:t> </a:t>
-            </a:r>
-            <a:r>
-              <a:rPr lang="en-US" dirty="0"/>
-              <a:t>error 'types do not match'</a:t>
-            </a:r>
-          </a:p>
-          <a:p>
-            <a:endParaRPr lang="en-US" dirty="0"/>
+              <a:rPr lang="en-US" sz="4000" u="sng" dirty="0" err="1" smtClean="0"/>
+              <a:t>é</a:t>
+            </a:r>
+            <a:r>
+              <a:rPr lang="en-US" sz="6000" i="1" u="sng" dirty="0" smtClean="0">
+                <a:solidFill>
+                  <a:srgbClr val="FFFF00"/>
+                </a:solidFill>
+              </a:rPr>
+              <a:t> x </a:t>
+            </a:r>
+            <a:r>
+              <a:rPr lang="en-US" sz="4000" u="sng" dirty="0" smtClean="0"/>
+              <a:t>= </a:t>
+            </a:r>
+            <a:r>
+              <a:rPr lang="en-US" sz="4000" u="sng" dirty="0" err="1" smtClean="0"/>
+              <a:t>inst</a:t>
+            </a:r>
+            <a:r>
+              <a:rPr lang="en-US" sz="4000" u="sng" dirty="0" smtClean="0"/>
+              <a:t>(</a:t>
+            </a:r>
+            <a:r>
+              <a:rPr lang="en-US" sz="4000" u="sng" dirty="0" err="1" smtClean="0"/>
+              <a:t>ß</a:t>
+            </a:r>
+            <a:r>
+              <a:rPr lang="en-US" sz="4000" u="sng" dirty="0" smtClean="0"/>
+              <a:t>)</a:t>
+            </a:r>
+          </a:p>
+          <a:p>
+            <a:pPr lvl="1"/>
+            <a:r>
+              <a:rPr lang="en-US" sz="4000" u="sng" dirty="0" smtClean="0"/>
+              <a:t>Gamma † x   x : T</a:t>
+            </a:r>
+            <a:endParaRPr lang="en-US" sz="4000" u="sng" dirty="0"/>
           </a:p>
         </p:txBody>
       </p:sp>
     </p:spTree>
     <p:extLst>
       <p:ext uri="{BB962C8B-B14F-4D97-AF65-F5344CB8AC3E}">
-        <p14:creationId xmlns:p14="http://schemas.microsoft.com/office/powerpoint/2010/main" val="940284962"/>
+        <p14:creationId xmlns:p14="http://schemas.microsoft.com/office/powerpoint/2010/main" val="1104665359"/>
       </p:ext>
     </p:extLst>
   </p:cSld>
@@ -5608,30 +5619,9 @@
   <p:cSld>
     <p:bg>
       <p:bgPr>
-        <a:gradFill flip="none" rotWithShape="1">
-          <a:gsLst>
-            <a:gs pos="0">
-              <a:srgbClr val="799EB8"/>
-            </a:gs>
-            <a:gs pos="42000">
-              <a:schemeClr val="accent1">
-                <a:lumMod val="45000"/>
-                <a:lumOff val="55000"/>
-              </a:schemeClr>
-            </a:gs>
-            <a:gs pos="42000">
-              <a:schemeClr val="accent1">
-                <a:lumMod val="45000"/>
-                <a:lumOff val="55000"/>
-              </a:schemeClr>
-            </a:gs>
-            <a:gs pos="100000">
-              <a:srgbClr val="DF718A"/>
-            </a:gs>
-          </a:gsLst>
-          <a:lin ang="18900000" scaled="1"/>
-          <a:tileRect/>
-        </a:gradFill>
+        <a:solidFill>
+          <a:schemeClr val="bg1"/>
+        </a:solidFill>
         <a:effectLst/>
       </p:bgPr>
     </p:bg>
@@ -5665,6 +5655,377 @@
           <a:lstStyle/>
           <a:p>
             <a:r>
+              <a:rPr lang="en-US" dirty="0" err="1" smtClean="0"/>
+              <a:t>Unitification</a:t>
+            </a:r>
+            <a:r>
+              <a:rPr lang="en-US" dirty="0" smtClean="0"/>
+              <a:t> (</a:t>
+            </a:r>
+            <a:r>
+              <a:rPr lang="en-US" dirty="0" err="1" smtClean="0"/>
+              <a:t>pesudo</a:t>
+            </a:r>
+            <a:r>
+              <a:rPr lang="en-US" dirty="0" smtClean="0"/>
+              <a:t> code)</a:t>
+            </a:r>
+            <a:endParaRPr lang="en-US" dirty="0"/>
+          </a:p>
+        </p:txBody>
+      </p:sp>
+      <p:sp>
+        <p:nvSpPr>
+          <p:cNvPr id="3" name="Content Placeholder 2"/>
+          <p:cNvSpPr>
+            <a:spLocks noGrp="1"/>
+          </p:cNvSpPr>
+          <p:nvPr>
+            <p:ph idx="1"/>
+          </p:nvPr>
+        </p:nvSpPr>
+        <p:spPr/>
+        <p:txBody>
+          <a:bodyPr/>
+          <a:lstStyle/>
+          <a:p>
+            <a:endParaRPr lang="en-US" dirty="0"/>
+          </a:p>
+          <a:p>
+            <a:endParaRPr lang="en-US" dirty="0"/>
+          </a:p>
+        </p:txBody>
+      </p:sp>
+      <p:sp>
+        <p:nvSpPr>
+          <p:cNvPr id="4" name="Slide Number Placeholder 3"/>
+          <p:cNvSpPr>
+            <a:spLocks noGrp="1"/>
+          </p:cNvSpPr>
+          <p:nvPr>
+            <p:ph type="sldNum" sz="quarter" idx="12"/>
+          </p:nvPr>
+        </p:nvSpPr>
+        <p:spPr/>
+        <p:txBody>
+          <a:bodyPr/>
+          <a:lstStyle/>
+          <a:p>
+            <a:fld id="{0AA1573F-8A70-3048-8CDE-BD6505795BEA}" type="slidenum">
+              <a:rPr lang="en-US" smtClean="0"/>
+              <a:t>7</a:t>
+            </a:fld>
+            <a:endParaRPr lang="en-US"/>
+          </a:p>
+        </p:txBody>
+      </p:sp>
+      <p:sp>
+        <p:nvSpPr>
+          <p:cNvPr id="5" name="Footer Placeholder 4"/>
+          <p:cNvSpPr>
+            <a:spLocks noGrp="1"/>
+          </p:cNvSpPr>
+          <p:nvPr>
+            <p:ph type="ftr" sz="quarter" idx="11"/>
+          </p:nvPr>
+        </p:nvSpPr>
+        <p:spPr/>
+        <p:txBody>
+          <a:bodyPr/>
+          <a:lstStyle/>
+          <a:p>
+            <a:r>
+              <a:rPr lang="en-US" smtClean="0"/>
+              <a:t>test</a:t>
+            </a:r>
+            <a:endParaRPr lang="en-US"/>
+          </a:p>
+        </p:txBody>
+      </p:sp>
+      <p:sp>
+        <p:nvSpPr>
+          <p:cNvPr id="7" name="TextBox 6"/>
+          <p:cNvSpPr txBox="1"/>
+          <p:nvPr/>
+        </p:nvSpPr>
+        <p:spPr>
+          <a:xfrm>
+            <a:off x="838200" y="1473201"/>
+            <a:ext cx="10885714" cy="2031325"/>
+          </a:xfrm>
+          <a:prstGeom prst="rect">
+            <a:avLst/>
+          </a:prstGeom>
+          <a:noFill/>
+        </p:spPr>
+        <p:txBody>
+          <a:bodyPr wrap="square" rtlCol="0">
+            <a:spAutoFit/>
+          </a:bodyPr>
+          <a:lstStyle/>
+          <a:p>
+            <a:r>
+              <a:rPr lang="en-US" dirty="0"/>
+              <a:t>unify(</a:t>
+            </a:r>
+            <a:r>
+              <a:rPr lang="en-US" dirty="0" err="1"/>
+              <a:t>ta,tb</a:t>
+            </a:r>
+            <a:r>
+              <a:rPr lang="en-US" dirty="0"/>
+              <a:t>): ta = find(ta) </a:t>
+            </a:r>
+            <a:r>
+              <a:rPr lang="en-US" dirty="0" err="1"/>
+              <a:t>tb</a:t>
+            </a:r>
+            <a:r>
+              <a:rPr lang="en-US" dirty="0"/>
+              <a:t> = find(</a:t>
+            </a:r>
+            <a:r>
+              <a:rPr lang="en-US" dirty="0" err="1"/>
+              <a:t>tb</a:t>
+            </a:r>
+            <a:r>
+              <a:rPr lang="en-US" dirty="0"/>
+              <a:t>) </a:t>
+            </a:r>
+            <a:endParaRPr lang="en-US" dirty="0" smtClean="0"/>
+          </a:p>
+          <a:p>
+            <a:r>
+              <a:rPr lang="en-US" b="1" dirty="0"/>
+              <a:t>	</a:t>
+            </a:r>
+            <a:r>
+              <a:rPr lang="en-US" b="1" dirty="0" smtClean="0"/>
+              <a:t>if</a:t>
+            </a:r>
+            <a:r>
+              <a:rPr lang="en-US" dirty="0" smtClean="0"/>
+              <a:t> </a:t>
+            </a:r>
+            <a:r>
+              <a:rPr lang="en-US" dirty="0"/>
+              <a:t>both </a:t>
+            </a:r>
+            <a:r>
+              <a:rPr lang="en-US" dirty="0" err="1"/>
+              <a:t>ta,tb</a:t>
+            </a:r>
+            <a:r>
+              <a:rPr lang="en-US" dirty="0"/>
+              <a:t> are terms of the form D p1..pn with identical </a:t>
+            </a:r>
+            <a:r>
+              <a:rPr lang="en-US" dirty="0" err="1"/>
+              <a:t>D,n</a:t>
+            </a:r>
+            <a:r>
+              <a:rPr lang="en-US" dirty="0"/>
+              <a:t> </a:t>
+            </a:r>
+            <a:endParaRPr lang="en-US" dirty="0" smtClean="0"/>
+          </a:p>
+          <a:p>
+            <a:r>
+              <a:rPr lang="en-US" b="1" dirty="0"/>
+              <a:t>	</a:t>
+            </a:r>
+            <a:r>
+              <a:rPr lang="en-US" b="1" dirty="0" smtClean="0"/>
+              <a:t>	then</a:t>
+            </a:r>
+            <a:r>
+              <a:rPr lang="en-US" dirty="0" smtClean="0"/>
+              <a:t> </a:t>
+            </a:r>
+            <a:r>
+              <a:rPr lang="en-US" dirty="0"/>
+              <a:t>unify(ta[</a:t>
+            </a:r>
+            <a:r>
+              <a:rPr lang="en-US" dirty="0" err="1"/>
+              <a:t>i</a:t>
+            </a:r>
+            <a:r>
+              <a:rPr lang="en-US" dirty="0"/>
+              <a:t>],</a:t>
+            </a:r>
+            <a:r>
+              <a:rPr lang="en-US" dirty="0" err="1"/>
+              <a:t>tb</a:t>
+            </a:r>
+            <a:r>
+              <a:rPr lang="en-US" dirty="0"/>
+              <a:t>[</a:t>
+            </a:r>
+            <a:r>
+              <a:rPr lang="en-US" dirty="0" err="1"/>
+              <a:t>i</a:t>
+            </a:r>
+            <a:r>
+              <a:rPr lang="en-US" dirty="0"/>
+              <a:t>]) for each corresponding </a:t>
+            </a:r>
+            <a:r>
+              <a:rPr lang="en-US" i="1" dirty="0" err="1"/>
+              <a:t>i</a:t>
+            </a:r>
+            <a:r>
+              <a:rPr lang="en-US" dirty="0" err="1"/>
+              <a:t>th</a:t>
+            </a:r>
+            <a:r>
+              <a:rPr lang="en-US" dirty="0"/>
+              <a:t> parameter </a:t>
+            </a:r>
+            <a:endParaRPr lang="en-US" dirty="0" smtClean="0"/>
+          </a:p>
+          <a:p>
+            <a:r>
+              <a:rPr lang="en-US" b="1" dirty="0"/>
+              <a:t>	</a:t>
+            </a:r>
+            <a:r>
+              <a:rPr lang="en-US" b="1" dirty="0" smtClean="0"/>
+              <a:t>else</a:t>
+            </a:r>
+            <a:r>
+              <a:rPr lang="en-US" dirty="0" smtClean="0"/>
+              <a:t> </a:t>
+            </a:r>
+            <a:r>
+              <a:rPr lang="en-US" b="1" dirty="0"/>
+              <a:t>if</a:t>
+            </a:r>
+            <a:r>
+              <a:rPr lang="en-US" dirty="0"/>
+              <a:t> at least one of </a:t>
+            </a:r>
+            <a:r>
+              <a:rPr lang="en-US" dirty="0" err="1"/>
+              <a:t>ta,tb</a:t>
+            </a:r>
+            <a:r>
+              <a:rPr lang="en-US" dirty="0"/>
+              <a:t> is a type </a:t>
+            </a:r>
+            <a:r>
+              <a:rPr lang="en-US" dirty="0" smtClean="0"/>
+              <a:t>variable</a:t>
+            </a:r>
+          </a:p>
+          <a:p>
+            <a:r>
+              <a:rPr lang="en-US" dirty="0"/>
+              <a:t>	</a:t>
+            </a:r>
+            <a:r>
+              <a:rPr lang="en-US" dirty="0" smtClean="0"/>
+              <a:t>	</a:t>
+            </a:r>
+            <a:r>
+              <a:rPr lang="en-US" b="1" dirty="0" smtClean="0"/>
+              <a:t>then</a:t>
+            </a:r>
+            <a:r>
+              <a:rPr lang="en-US" dirty="0" smtClean="0"/>
+              <a:t> </a:t>
+            </a:r>
+            <a:r>
+              <a:rPr lang="en-US" dirty="0"/>
+              <a:t>union(</a:t>
+            </a:r>
+            <a:r>
+              <a:rPr lang="en-US" dirty="0" err="1"/>
+              <a:t>ta,tb</a:t>
+            </a:r>
+            <a:r>
+              <a:rPr lang="en-US" dirty="0"/>
+              <a:t>) </a:t>
+            </a:r>
+            <a:endParaRPr lang="en-US" dirty="0" smtClean="0"/>
+          </a:p>
+          <a:p>
+            <a:r>
+              <a:rPr lang="en-US" b="1" dirty="0"/>
+              <a:t>	</a:t>
+            </a:r>
+            <a:r>
+              <a:rPr lang="en-US" b="1" dirty="0" smtClean="0"/>
+              <a:t>else</a:t>
+            </a:r>
+            <a:r>
+              <a:rPr lang="en-US" dirty="0" smtClean="0"/>
+              <a:t> </a:t>
+            </a:r>
+            <a:r>
+              <a:rPr lang="en-US" dirty="0"/>
+              <a:t>error 'types do not match'</a:t>
+            </a:r>
+          </a:p>
+          <a:p>
+            <a:endParaRPr lang="en-US" dirty="0"/>
+          </a:p>
+        </p:txBody>
+      </p:sp>
+    </p:spTree>
+    <p:extLst>
+      <p:ext uri="{BB962C8B-B14F-4D97-AF65-F5344CB8AC3E}">
+        <p14:creationId xmlns:p14="http://schemas.microsoft.com/office/powerpoint/2010/main" val="940284962"/>
+      </p:ext>
+    </p:extLst>
+  </p:cSld>
+  <p:clrMapOvr>
+    <a:masterClrMapping/>
+  </p:clrMapOvr>
+</p:sld>
+</file>
+
+<file path=ppt/slides/slide7.xml><?xml version="1.0" encoding="utf-8"?>
+<p:sld xmlns:a="http://schemas.openxmlformats.org/drawingml/2006/main" xmlns:r="http://schemas.openxmlformats.org/officeDocument/2006/relationships" xmlns:p="http://schemas.openxmlformats.org/presentationml/2006/main">
+  <p:cSld>
+    <p:bg>
+      <p:bgPr>
+        <a:solidFill>
+          <a:schemeClr val="bg1"/>
+        </a:solidFill>
+        <a:effectLst/>
+      </p:bgPr>
+    </p:bg>
+    <p:spTree>
+      <p:nvGrpSpPr>
+        <p:cNvPr id="1" name=""/>
+        <p:cNvGrpSpPr/>
+        <p:nvPr/>
+      </p:nvGrpSpPr>
+      <p:grpSpPr>
+        <a:xfrm>
+          <a:off x="0" y="0"/>
+          <a:ext cx="0" cy="0"/>
+          <a:chOff x="0" y="0"/>
+          <a:chExt cx="0" cy="0"/>
+        </a:xfrm>
+      </p:grpSpPr>
+      <p:sp>
+        <p:nvSpPr>
+          <p:cNvPr id="2" name="Title 1"/>
+          <p:cNvSpPr>
+            <a:spLocks noGrp="1"/>
+          </p:cNvSpPr>
+          <p:nvPr>
+            <p:ph type="title"/>
+          </p:nvPr>
+        </p:nvSpPr>
+        <p:spPr/>
+        <p:txBody>
+          <a:bodyPr/>
+          <a:lstStyle/>
+          <a:p>
+            <a:r>
               <a:rPr lang="en-US" dirty="0" smtClean="0"/>
               <a:t>The Basics of the Diagonal Argument</a:t>
             </a:r>
@@ -5711,7 +6072,7 @@
           <a:p>
             <a:fld id="{0AA1573F-8A70-3048-8CDE-BD6505795BEA}" type="slidenum">
               <a:rPr lang="en-US" smtClean="0"/>
-              <a:t>7</a:t>
+              <a:t>8</a:t>
             </a:fld>
             <a:endParaRPr lang="en-US"/>
           </a:p>
@@ -5843,35 +6204,14 @@
 </p:sld>
 </file>
 
-<file path=ppt/slides/slide7.xml><?xml version="1.0" encoding="utf-8"?>
+<file path=ppt/slides/slide8.xml><?xml version="1.0" encoding="utf-8"?>
 <p:sld xmlns:a="http://schemas.openxmlformats.org/drawingml/2006/main" xmlns:r="http://schemas.openxmlformats.org/officeDocument/2006/relationships" xmlns:p="http://schemas.openxmlformats.org/presentationml/2006/main">
   <p:cSld>
     <p:bg>
       <p:bgPr>
-        <a:gradFill flip="none" rotWithShape="1">
-          <a:gsLst>
-            <a:gs pos="0">
-              <a:srgbClr val="799EB8"/>
-            </a:gs>
-            <a:gs pos="42000">
-              <a:schemeClr val="accent1">
-                <a:lumMod val="45000"/>
-                <a:lumOff val="55000"/>
-              </a:schemeClr>
-            </a:gs>
-            <a:gs pos="42000">
-              <a:schemeClr val="accent1">
-                <a:lumMod val="45000"/>
-                <a:lumOff val="55000"/>
-              </a:schemeClr>
-            </a:gs>
-            <a:gs pos="100000">
-              <a:srgbClr val="DF718A"/>
-            </a:gs>
-          </a:gsLst>
-          <a:lin ang="18900000" scaled="1"/>
-          <a:tileRect/>
-        </a:gradFill>
+        <a:solidFill>
+          <a:schemeClr val="bg1"/>
+        </a:solidFill>
         <a:effectLst/>
       </p:bgPr>
     </p:bg>
@@ -5947,7 +6287,7 @@
           <a:p>
             <a:fld id="{0AA1573F-8A70-3048-8CDE-BD6505795BEA}" type="slidenum">
               <a:rPr lang="en-US" smtClean="0"/>
-              <a:t>8</a:t>
+              <a:t>9</a:t>
             </a:fld>
             <a:endParaRPr lang="en-US"/>
           </a:p>
@@ -6019,35 +6359,14 @@
 </p:sld>
 </file>
 
-<file path=ppt/slides/slide8.xml><?xml version="1.0" encoding="utf-8"?>
+<file path=ppt/slides/slide9.xml><?xml version="1.0" encoding="utf-8"?>
 <p:sld xmlns:a="http://schemas.openxmlformats.org/drawingml/2006/main" xmlns:r="http://schemas.openxmlformats.org/officeDocument/2006/relationships" xmlns:p="http://schemas.openxmlformats.org/presentationml/2006/main">
   <p:cSld>
     <p:bg>
       <p:bgPr>
-        <a:gradFill flip="none" rotWithShape="1">
-          <a:gsLst>
-            <a:gs pos="0">
-              <a:srgbClr val="799EB8"/>
-            </a:gs>
-            <a:gs pos="42000">
-              <a:schemeClr val="accent1">
-                <a:lumMod val="45000"/>
-                <a:lumOff val="55000"/>
-              </a:schemeClr>
-            </a:gs>
-            <a:gs pos="42000">
-              <a:schemeClr val="accent1">
-                <a:lumMod val="45000"/>
-                <a:lumOff val="55000"/>
-              </a:schemeClr>
-            </a:gs>
-            <a:gs pos="100000">
-              <a:srgbClr val="DF718A"/>
-            </a:gs>
-          </a:gsLst>
-          <a:lin ang="18900000" scaled="1"/>
-          <a:tileRect/>
-        </a:gradFill>
+        <a:solidFill>
+          <a:schemeClr val="bg1"/>
+        </a:solidFill>
         <a:effectLst/>
       </p:bgPr>
     </p:bg>
@@ -6127,7 +6446,7 @@
           <a:p>
             <a:fld id="{0AA1573F-8A70-3048-8CDE-BD6505795BEA}" type="slidenum">
               <a:rPr lang="en-US" smtClean="0"/>
-              <a:t>9</a:t>
+              <a:t>10</a:t>
             </a:fld>
             <a:endParaRPr lang="en-US"/>
           </a:p>
@@ -6190,199 +6509,6 @@
     <p:extLst>
       <p:ext uri="{BB962C8B-B14F-4D97-AF65-F5344CB8AC3E}">
         <p14:creationId xmlns:p14="http://schemas.microsoft.com/office/powerpoint/2010/main" val="1755064999"/>
-      </p:ext>
-    </p:extLst>
-  </p:cSld>
-  <p:clrMapOvr>
-    <a:masterClrMapping/>
-  </p:clrMapOvr>
-</p:sld>
-</file>
-
-<file path=ppt/slides/slide9.xml><?xml version="1.0" encoding="utf-8"?>
-<p:sld xmlns:a="http://schemas.openxmlformats.org/drawingml/2006/main" xmlns:r="http://schemas.openxmlformats.org/officeDocument/2006/relationships" xmlns:p="http://schemas.openxmlformats.org/presentationml/2006/main">
-  <p:cSld>
-    <p:bg>
-      <p:bgPr>
-        <a:gradFill flip="none" rotWithShape="1">
-          <a:gsLst>
-            <a:gs pos="0">
-              <a:srgbClr val="799EB8"/>
-            </a:gs>
-            <a:gs pos="42000">
-              <a:schemeClr val="accent1">
-                <a:lumMod val="45000"/>
-                <a:lumOff val="55000"/>
-              </a:schemeClr>
-            </a:gs>
-            <a:gs pos="42000">
-              <a:schemeClr val="accent1">
-                <a:lumMod val="45000"/>
-                <a:lumOff val="55000"/>
-              </a:schemeClr>
-            </a:gs>
-            <a:gs pos="100000">
-              <a:srgbClr val="DF718A"/>
-            </a:gs>
-          </a:gsLst>
-          <a:lin ang="18900000" scaled="1"/>
-          <a:tileRect/>
-        </a:gradFill>
-        <a:effectLst/>
-      </p:bgPr>
-    </p:bg>
-    <p:spTree>
-      <p:nvGrpSpPr>
-        <p:cNvPr id="1" name=""/>
-        <p:cNvGrpSpPr/>
-        <p:nvPr/>
-      </p:nvGrpSpPr>
-      <p:grpSpPr>
-        <a:xfrm>
-          <a:off x="0" y="0"/>
-          <a:ext cx="0" cy="0"/>
-          <a:chOff x="0" y="0"/>
-          <a:chExt cx="0" cy="0"/>
-        </a:xfrm>
-      </p:grpSpPr>
-      <p:sp>
-        <p:nvSpPr>
-          <p:cNvPr id="2" name="Title 1"/>
-          <p:cNvSpPr>
-            <a:spLocks noGrp="1"/>
-          </p:cNvSpPr>
-          <p:nvPr>
-            <p:ph type="title"/>
-          </p:nvPr>
-        </p:nvSpPr>
-        <p:spPr>
-          <a:xfrm>
-            <a:off x="1312334" y="109537"/>
-            <a:ext cx="10515600" cy="1325563"/>
-          </a:xfrm>
-        </p:spPr>
-        <p:txBody>
-          <a:bodyPr/>
-          <a:lstStyle/>
-          <a:p>
-            <a:r>
-              <a:rPr lang="en-US" dirty="0" smtClean="0"/>
-              <a:t>Has this proof been explored before</a:t>
-            </a:r>
-            <a:r>
-              <a:rPr lang="mr-IN" dirty="0" smtClean="0"/>
-              <a:t>…</a:t>
-            </a:r>
-            <a:r>
-              <a:rPr lang="en-US" dirty="0" smtClean="0"/>
-              <a:t> yes</a:t>
-            </a:r>
-            <a:endParaRPr lang="en-US" dirty="0"/>
-          </a:p>
-        </p:txBody>
-      </p:sp>
-      <p:sp>
-        <p:nvSpPr>
-          <p:cNvPr id="3" name="Content Placeholder 2"/>
-          <p:cNvSpPr>
-            <a:spLocks noGrp="1"/>
-          </p:cNvSpPr>
-          <p:nvPr>
-            <p:ph idx="1"/>
-          </p:nvPr>
-        </p:nvSpPr>
-        <p:spPr/>
-        <p:txBody>
-          <a:bodyPr/>
-          <a:lstStyle/>
-          <a:p>
-            <a:endParaRPr lang="en-US" dirty="0"/>
-          </a:p>
-          <a:p>
-            <a:endParaRPr lang="en-US" dirty="0"/>
-          </a:p>
-        </p:txBody>
-      </p:sp>
-      <p:sp>
-        <p:nvSpPr>
-          <p:cNvPr id="4" name="Slide Number Placeholder 3"/>
-          <p:cNvSpPr>
-            <a:spLocks noGrp="1"/>
-          </p:cNvSpPr>
-          <p:nvPr>
-            <p:ph type="sldNum" sz="quarter" idx="12"/>
-          </p:nvPr>
-        </p:nvSpPr>
-        <p:spPr/>
-        <p:txBody>
-          <a:bodyPr/>
-          <a:lstStyle/>
-          <a:p>
-            <a:fld id="{0AA1573F-8A70-3048-8CDE-BD6505795BEA}" type="slidenum">
-              <a:rPr lang="en-US" smtClean="0"/>
-              <a:t>10</a:t>
-            </a:fld>
-            <a:endParaRPr lang="en-US"/>
-          </a:p>
-        </p:txBody>
-      </p:sp>
-      <p:sp>
-        <p:nvSpPr>
-          <p:cNvPr id="5" name="Footer Placeholder 4"/>
-          <p:cNvSpPr>
-            <a:spLocks noGrp="1"/>
-          </p:cNvSpPr>
-          <p:nvPr>
-            <p:ph type="ftr" sz="quarter" idx="11"/>
-          </p:nvPr>
-        </p:nvSpPr>
-        <p:spPr/>
-        <p:txBody>
-          <a:bodyPr/>
-          <a:lstStyle/>
-          <a:p>
-            <a:r>
-              <a:rPr lang="en-US" smtClean="0"/>
-              <a:t>test</a:t>
-            </a:r>
-            <a:endParaRPr lang="en-US"/>
-          </a:p>
-        </p:txBody>
-      </p:sp>
-      <p:pic>
-        <p:nvPicPr>
-          <p:cNvPr id="7" name="Picture 6"/>
-          <p:cNvPicPr>
-            <a:picLocks noChangeAspect="1"/>
-          </p:cNvPicPr>
-          <p:nvPr/>
-        </p:nvPicPr>
-        <p:blipFill>
-          <a:blip r:embed="rId3">
-            <a:extLst>
-              <a:ext uri="{28A0092B-C50C-407E-A947-70E740481C1C}">
-                <a14:useLocalDpi xmlns:a14="http://schemas.microsoft.com/office/drawing/2010/main" val="0"/>
-              </a:ext>
-            </a:extLst>
-          </a:blip>
-          <a:stretch>
-            <a:fillRect/>
-          </a:stretch>
-        </p:blipFill>
-        <p:spPr>
-          <a:xfrm>
-            <a:off x="1532467" y="1317181"/>
-            <a:ext cx="8678333" cy="5794819"/>
-          </a:xfrm>
-          <a:prstGeom prst="rect">
-            <a:avLst/>
-          </a:prstGeom>
-        </p:spPr>
-      </p:pic>
-    </p:spTree>
-    <p:extLst>
-      <p:ext uri="{BB962C8B-B14F-4D97-AF65-F5344CB8AC3E}">
-        <p14:creationId xmlns:p14="http://schemas.microsoft.com/office/powerpoint/2010/main" val="1783135862"/>
       </p:ext>
     </p:extLst>
   </p:cSld>

</xml_diff>

<commit_message>
proof of soundness and completeness
</commit_message>
<xml_diff>
--- a/Presentation1.pptx
+++ b/Presentation1.pptx
@@ -32,8 +32,8 @@
     <p:sldId id="289" r:id="rId20"/>
     <p:sldId id="290" r:id="rId21"/>
     <p:sldId id="264" r:id="rId22"/>
-    <p:sldId id="274" r:id="rId23"/>
-    <p:sldId id="275" r:id="rId24"/>
+    <p:sldId id="275" r:id="rId23"/>
+    <p:sldId id="274" r:id="rId24"/>
     <p:sldId id="281" r:id="rId25"/>
     <p:sldId id="265" r:id="rId26"/>
     <p:sldId id="283" r:id="rId27"/>
@@ -5734,7 +5734,7 @@
         </p:blipFill>
         <p:spPr>
           <a:xfrm>
-            <a:off x="-22417" y="1948070"/>
+            <a:off x="-22417" y="139148"/>
             <a:ext cx="12214417" cy="1092165"/>
           </a:xfrm>
         </p:spPr>
@@ -5749,7 +5749,7 @@
             </p:nvSpPr>
             <p:spPr>
               <a:xfrm>
-                <a:off x="1590261" y="3399183"/>
+                <a:off x="1451113" y="1690688"/>
                 <a:ext cx="8686800" cy="913007"/>
               </a:xfrm>
               <a:prstGeom prst="rect">
@@ -5935,7 +5935,7 @@
             </p:nvSpPr>
             <p:spPr>
               <a:xfrm>
-                <a:off x="1590261" y="3399183"/>
+                <a:off x="1451113" y="1690688"/>
                 <a:ext cx="8686800" cy="913007"/>
               </a:xfrm>
               <a:prstGeom prst="rect">
@@ -5963,6 +5963,330 @@
           </p:sp>
         </mc:Fallback>
       </mc:AlternateContent>
+      <p:sp>
+        <p:nvSpPr>
+          <p:cNvPr id="5" name="TextBox 4"/>
+          <p:cNvSpPr txBox="1"/>
+          <p:nvPr/>
+        </p:nvSpPr>
+        <p:spPr>
+          <a:xfrm>
+            <a:off x="838200" y="2603695"/>
+            <a:ext cx="10830339" cy="2031325"/>
+          </a:xfrm>
+          <a:prstGeom prst="rect">
+            <a:avLst/>
+          </a:prstGeom>
+          <a:noFill/>
+        </p:spPr>
+        <p:txBody>
+          <a:bodyPr wrap="square" rtlCol="0">
+            <a:spAutoFit/>
+          </a:bodyPr>
+          <a:lstStyle/>
+          <a:p>
+            <a:r>
+              <a:rPr lang="en-US" dirty="0"/>
+              <a:t>The T-</a:t>
+            </a:r>
+            <a:r>
+              <a:rPr lang="en-US" dirty="0" err="1"/>
+              <a:t>Var</a:t>
+            </a:r>
+            <a:r>
+              <a:rPr lang="en-US" dirty="0"/>
+              <a:t> rule, simply pull the type of the variable out of the typing context.</a:t>
+            </a:r>
+          </a:p>
+          <a:p>
+            <a:r>
+              <a:rPr lang="en-US" dirty="0" err="1"/>
+              <a:t>Var</a:t>
+            </a:r>
+            <a:r>
+              <a:rPr lang="en-US" dirty="0"/>
+              <a:t> x </a:t>
+            </a:r>
+            <a:r>
+              <a:rPr lang="en-US" dirty="0"/>
+              <a:t>-&gt;</a:t>
+            </a:r>
+            <a:r>
+              <a:rPr lang="en-US" dirty="0"/>
+              <a:t> </a:t>
+            </a:r>
+            <a:r>
+              <a:rPr lang="en-US" dirty="0" err="1"/>
+              <a:t>lookupEnv</a:t>
+            </a:r>
+            <a:r>
+              <a:rPr lang="en-US" dirty="0"/>
+              <a:t> </a:t>
+            </a:r>
+            <a:r>
+              <a:rPr lang="en-US" dirty="0" err="1"/>
+              <a:t>env</a:t>
+            </a:r>
+            <a:r>
+              <a:rPr lang="en-US" dirty="0"/>
+              <a:t> </a:t>
+            </a:r>
+            <a:r>
+              <a:rPr lang="en-US" dirty="0" err="1"/>
+              <a:t>x</a:t>
+            </a:r>
+            <a:r>
+              <a:rPr lang="en-US" dirty="0" err="1"/>
+              <a:t>The</a:t>
+            </a:r>
+            <a:r>
+              <a:rPr lang="en-US" dirty="0"/>
+              <a:t> function </a:t>
+            </a:r>
+            <a:r>
+              <a:rPr lang="en-US" dirty="0" err="1"/>
+              <a:t>lookupVar</a:t>
+            </a:r>
+            <a:r>
+              <a:rPr lang="en-US" dirty="0"/>
+              <a:t> looks up the local variable reference in typing environment and if found it instantiates a fresh copy.</a:t>
+            </a:r>
+          </a:p>
+          <a:p>
+            <a:r>
+              <a:rPr lang="en-US" dirty="0" err="1"/>
+              <a:t>lookupEnv</a:t>
+            </a:r>
+            <a:r>
+              <a:rPr lang="en-US" dirty="0"/>
+              <a:t> ::</a:t>
+            </a:r>
+            <a:r>
+              <a:rPr lang="en-US" dirty="0"/>
+              <a:t> </a:t>
+            </a:r>
+            <a:r>
+              <a:rPr lang="en-US" dirty="0" err="1"/>
+              <a:t>TypeEnv</a:t>
+            </a:r>
+            <a:r>
+              <a:rPr lang="en-US" dirty="0"/>
+              <a:t> </a:t>
+            </a:r>
+            <a:r>
+              <a:rPr lang="en-US" dirty="0"/>
+              <a:t>-&gt;</a:t>
+            </a:r>
+            <a:r>
+              <a:rPr lang="en-US" dirty="0"/>
+              <a:t> </a:t>
+            </a:r>
+            <a:r>
+              <a:rPr lang="en-US" dirty="0" err="1"/>
+              <a:t>Var</a:t>
+            </a:r>
+            <a:r>
+              <a:rPr lang="en-US" dirty="0"/>
+              <a:t> </a:t>
+            </a:r>
+            <a:r>
+              <a:rPr lang="en-US" dirty="0"/>
+              <a:t>-&gt;</a:t>
+            </a:r>
+            <a:r>
+              <a:rPr lang="en-US" dirty="0"/>
+              <a:t> </a:t>
+            </a:r>
+            <a:r>
+              <a:rPr lang="en-US" dirty="0"/>
+              <a:t>Infer</a:t>
+            </a:r>
+            <a:r>
+              <a:rPr lang="en-US" dirty="0"/>
+              <a:t> (</a:t>
+            </a:r>
+            <a:r>
+              <a:rPr lang="en-US" dirty="0" err="1"/>
+              <a:t>Subst</a:t>
+            </a:r>
+            <a:r>
+              <a:rPr lang="en-US" dirty="0"/>
+              <a:t>, </a:t>
+            </a:r>
+            <a:r>
+              <a:rPr lang="en-US" dirty="0"/>
+              <a:t>Type</a:t>
+            </a:r>
+            <a:r>
+              <a:rPr lang="en-US" dirty="0"/>
+              <a:t>) </a:t>
+            </a:r>
+            <a:r>
+              <a:rPr lang="en-US" dirty="0" err="1"/>
+              <a:t>lookupEnv</a:t>
+            </a:r>
+            <a:r>
+              <a:rPr lang="en-US" dirty="0"/>
+              <a:t> (</a:t>
+            </a:r>
+            <a:r>
+              <a:rPr lang="en-US" dirty="0" err="1"/>
+              <a:t>TypeEnv</a:t>
+            </a:r>
+            <a:r>
+              <a:rPr lang="en-US" dirty="0"/>
+              <a:t> </a:t>
+            </a:r>
+            <a:r>
+              <a:rPr lang="en-US" dirty="0" err="1"/>
+              <a:t>env</a:t>
+            </a:r>
+            <a:r>
+              <a:rPr lang="en-US" dirty="0"/>
+              <a:t>) x </a:t>
+            </a:r>
+            <a:r>
+              <a:rPr lang="en-US" dirty="0"/>
+              <a:t>=</a:t>
+            </a:r>
+            <a:r>
+              <a:rPr lang="en-US" dirty="0"/>
+              <a:t> </a:t>
+            </a:r>
+            <a:r>
+              <a:rPr lang="en-US" b="1" dirty="0"/>
+              <a:t>do</a:t>
+            </a:r>
+            <a:r>
+              <a:rPr lang="en-US" dirty="0"/>
+              <a:t> </a:t>
+            </a:r>
+            <a:r>
+              <a:rPr lang="en-US" b="1" dirty="0"/>
+              <a:t>case</a:t>
+            </a:r>
+            <a:r>
+              <a:rPr lang="en-US" dirty="0"/>
+              <a:t> </a:t>
+            </a:r>
+            <a:r>
+              <a:rPr lang="en-US" dirty="0" err="1"/>
+              <a:t>Map.lookup</a:t>
+            </a:r>
+            <a:r>
+              <a:rPr lang="en-US" dirty="0"/>
+              <a:t> x </a:t>
+            </a:r>
+            <a:r>
+              <a:rPr lang="en-US" dirty="0" err="1"/>
+              <a:t>env</a:t>
+            </a:r>
+            <a:r>
+              <a:rPr lang="en-US" dirty="0"/>
+              <a:t> </a:t>
+            </a:r>
+            <a:r>
+              <a:rPr lang="en-US" b="1" dirty="0"/>
+              <a:t>of</a:t>
+            </a:r>
+            <a:r>
+              <a:rPr lang="en-US" dirty="0"/>
+              <a:t> </a:t>
+            </a:r>
+            <a:r>
+              <a:rPr lang="en-US" dirty="0"/>
+              <a:t>Nothing</a:t>
+            </a:r>
+            <a:r>
+              <a:rPr lang="en-US" dirty="0"/>
+              <a:t> </a:t>
+            </a:r>
+            <a:r>
+              <a:rPr lang="en-US" dirty="0"/>
+              <a:t>-&gt;</a:t>
+            </a:r>
+            <a:r>
+              <a:rPr lang="en-US" dirty="0"/>
+              <a:t> </a:t>
+            </a:r>
+            <a:r>
+              <a:rPr lang="en-US" dirty="0" err="1"/>
+              <a:t>throwError</a:t>
+            </a:r>
+            <a:r>
+              <a:rPr lang="en-US" dirty="0"/>
+              <a:t> </a:t>
+            </a:r>
+            <a:r>
+              <a:rPr lang="en-US" dirty="0"/>
+              <a:t>$</a:t>
+            </a:r>
+            <a:r>
+              <a:rPr lang="en-US" dirty="0"/>
+              <a:t> </a:t>
+            </a:r>
+            <a:r>
+              <a:rPr lang="en-US" dirty="0" err="1"/>
+              <a:t>UnboundVariable</a:t>
+            </a:r>
+            <a:r>
+              <a:rPr lang="en-US" dirty="0"/>
+              <a:t> (show x) </a:t>
+            </a:r>
+            <a:r>
+              <a:rPr lang="en-US" dirty="0"/>
+              <a:t>Just</a:t>
+            </a:r>
+            <a:r>
+              <a:rPr lang="en-US" dirty="0"/>
+              <a:t> s </a:t>
+            </a:r>
+            <a:r>
+              <a:rPr lang="en-US" dirty="0"/>
+              <a:t>-&gt;</a:t>
+            </a:r>
+            <a:r>
+              <a:rPr lang="en-US" dirty="0"/>
+              <a:t> </a:t>
+            </a:r>
+            <a:r>
+              <a:rPr lang="en-US" b="1" dirty="0"/>
+              <a:t>do</a:t>
+            </a:r>
+            <a:r>
+              <a:rPr lang="en-US" dirty="0"/>
+              <a:t> t </a:t>
+            </a:r>
+            <a:r>
+              <a:rPr lang="en-US" dirty="0"/>
+              <a:t>&lt;-</a:t>
+            </a:r>
+            <a:r>
+              <a:rPr lang="en-US" dirty="0"/>
+              <a:t> instantiate s return (</a:t>
+            </a:r>
+            <a:r>
+              <a:rPr lang="en-US" dirty="0" err="1"/>
+              <a:t>nullSubst</a:t>
+            </a:r>
+            <a:r>
+              <a:rPr lang="en-US" dirty="0"/>
+              <a:t>, t)</a:t>
+            </a:r>
+            <a:r>
+              <a:rPr lang="en-US" dirty="0"/>
+              <a:t/>
+            </a:r>
+            <a:br>
+              <a:rPr lang="en-US" dirty="0"/>
+            </a:br>
+            <a:endParaRPr lang="en-US" dirty="0"/>
+          </a:p>
+          <a:p>
+            <a:endParaRPr lang="en-US" dirty="0"/>
+          </a:p>
+        </p:txBody>
+      </p:sp>
     </p:spTree>
     <p:extLst>
       <p:ext uri="{BB962C8B-B14F-4D97-AF65-F5344CB8AC3E}">
@@ -6036,7 +6360,7 @@
         </p:blipFill>
         <p:spPr>
           <a:xfrm>
-            <a:off x="0" y="2183893"/>
+            <a:off x="0" y="0"/>
             <a:ext cx="12192000" cy="1048774"/>
           </a:xfrm>
         </p:spPr>
@@ -6051,7 +6375,7 @@
             </p:nvSpPr>
             <p:spPr>
               <a:xfrm>
-                <a:off x="0" y="3478696"/>
+                <a:off x="0" y="1413899"/>
                 <a:ext cx="12192000" cy="1000017"/>
               </a:xfrm>
               <a:prstGeom prst="rect">
@@ -6645,7 +6969,7 @@
             </p:nvSpPr>
             <p:spPr>
               <a:xfrm>
-                <a:off x="0" y="3478696"/>
+                <a:off x="0" y="1413899"/>
                 <a:ext cx="12192000" cy="1000017"/>
               </a:xfrm>
               <a:prstGeom prst="rect">
@@ -6673,6 +6997,179 @@
           </p:sp>
         </mc:Fallback>
       </mc:AlternateContent>
+      <p:sp>
+        <p:nvSpPr>
+          <p:cNvPr id="5" name="TextBox 4"/>
+          <p:cNvSpPr txBox="1"/>
+          <p:nvPr/>
+        </p:nvSpPr>
+        <p:spPr>
+          <a:xfrm>
+            <a:off x="0" y="2604052"/>
+            <a:ext cx="12006470" cy="2308324"/>
+          </a:xfrm>
+          <a:prstGeom prst="rect">
+            <a:avLst/>
+          </a:prstGeom>
+          <a:noFill/>
+        </p:spPr>
+        <p:txBody>
+          <a:bodyPr wrap="square" rtlCol="0">
+            <a:spAutoFit/>
+          </a:bodyPr>
+          <a:lstStyle/>
+          <a:p>
+            <a:r>
+              <a:rPr lang="en-US" dirty="0"/>
+              <a:t>For applications, the first argument must be a lambda expression or return a lambda expression, so know it must be of form t1 -&gt; t2 but the output type is not determined except by the confluence of the two values. We infer both types, apply the constraints from the first argument over the result second inferred type and then unify the two types with the excepted form of the entire application expression.</a:t>
+            </a:r>
+          </a:p>
+          <a:p>
+            <a:r>
+              <a:rPr lang="en-US" dirty="0"/>
+              <a:t>App</a:t>
+            </a:r>
+            <a:r>
+              <a:rPr lang="en-US" dirty="0"/>
+              <a:t> e1 e2 </a:t>
+            </a:r>
+            <a:r>
+              <a:rPr lang="en-US" dirty="0"/>
+              <a:t>-&gt;</a:t>
+            </a:r>
+            <a:r>
+              <a:rPr lang="en-US" dirty="0"/>
+              <a:t> </a:t>
+            </a:r>
+            <a:r>
+              <a:rPr lang="en-US" b="1" dirty="0"/>
+              <a:t>do</a:t>
+            </a:r>
+            <a:r>
+              <a:rPr lang="en-US" dirty="0"/>
+              <a:t> </a:t>
+            </a:r>
+            <a:r>
+              <a:rPr lang="en-US" dirty="0" err="1"/>
+              <a:t>tv</a:t>
+            </a:r>
+            <a:r>
+              <a:rPr lang="en-US" dirty="0"/>
+              <a:t> </a:t>
+            </a:r>
+            <a:r>
+              <a:rPr lang="en-US" dirty="0"/>
+              <a:t>&lt;-</a:t>
+            </a:r>
+            <a:r>
+              <a:rPr lang="en-US" dirty="0"/>
+              <a:t> fresh (s1, t1) </a:t>
+            </a:r>
+            <a:r>
+              <a:rPr lang="en-US" dirty="0"/>
+              <a:t>&lt;-</a:t>
+            </a:r>
+            <a:r>
+              <a:rPr lang="en-US" dirty="0"/>
+              <a:t> infer </a:t>
+            </a:r>
+            <a:r>
+              <a:rPr lang="en-US" dirty="0" err="1"/>
+              <a:t>env</a:t>
+            </a:r>
+            <a:r>
+              <a:rPr lang="en-US" dirty="0"/>
+              <a:t> e1 (s2, t2) </a:t>
+            </a:r>
+            <a:r>
+              <a:rPr lang="en-US" dirty="0"/>
+              <a:t>&lt;-</a:t>
+            </a:r>
+            <a:r>
+              <a:rPr lang="en-US" dirty="0"/>
+              <a:t> infer (apply s1 </a:t>
+            </a:r>
+            <a:r>
+              <a:rPr lang="en-US" dirty="0" err="1"/>
+              <a:t>env</a:t>
+            </a:r>
+            <a:r>
+              <a:rPr lang="en-US" dirty="0"/>
+              <a:t>) e2 s3 </a:t>
+            </a:r>
+            <a:r>
+              <a:rPr lang="en-US" dirty="0"/>
+              <a:t>&lt;-</a:t>
+            </a:r>
+            <a:r>
+              <a:rPr lang="en-US" dirty="0"/>
+              <a:t> unify (apply s2 t1) (</a:t>
+            </a:r>
+            <a:r>
+              <a:rPr lang="en-US" dirty="0" err="1"/>
+              <a:t>TArr</a:t>
+            </a:r>
+            <a:r>
+              <a:rPr lang="en-US" dirty="0"/>
+              <a:t> t2 </a:t>
+            </a:r>
+            <a:r>
+              <a:rPr lang="en-US" dirty="0" err="1"/>
+              <a:t>tv</a:t>
+            </a:r>
+            <a:r>
+              <a:rPr lang="en-US" dirty="0"/>
+              <a:t>) return (s3 </a:t>
+            </a:r>
+            <a:r>
+              <a:rPr lang="en-US" dirty="0"/>
+              <a:t>`compose`</a:t>
+            </a:r>
+            <a:r>
+              <a:rPr lang="en-US" dirty="0"/>
+              <a:t> s2 </a:t>
+            </a:r>
+            <a:r>
+              <a:rPr lang="en-US" dirty="0"/>
+              <a:t>`compose`</a:t>
+            </a:r>
+            <a:r>
+              <a:rPr lang="en-US" dirty="0"/>
+              <a:t> s1, apply s3 </a:t>
+            </a:r>
+            <a:r>
+              <a:rPr lang="en-US" dirty="0" err="1"/>
+              <a:t>tv</a:t>
+            </a:r>
+            <a:r>
+              <a:rPr lang="en-US" dirty="0"/>
+              <a:t>)</a:t>
+            </a:r>
+            <a:r>
+              <a:rPr lang="en-US" dirty="0"/>
+              <a:t>Γ⊢e1:τ1→τ2Γ⊢e2:τ1Γ⊢e1 e2:τ2(</a:t>
+            </a:r>
+            <a:r>
+              <a:rPr lang="en-US" b="1" dirty="0"/>
+              <a:t>T-App</a:t>
+            </a:r>
+            <a:r>
+              <a:rPr lang="en-US" dirty="0"/>
+              <a:t>)</a:t>
+            </a:r>
+          </a:p>
+          <a:p>
+            <a:r>
+              <a:rPr lang="en-US" dirty="0"/>
+              <a:t/>
+            </a:r>
+            <a:br>
+              <a:rPr lang="en-US" dirty="0"/>
+            </a:br>
+            <a:endParaRPr lang="en-US" dirty="0"/>
+          </a:p>
+        </p:txBody>
+      </p:sp>
     </p:spTree>
     <p:extLst>
       <p:ext uri="{BB962C8B-B14F-4D97-AF65-F5344CB8AC3E}">
@@ -6746,7 +7243,7 @@
         </p:blipFill>
         <p:spPr>
           <a:xfrm>
-            <a:off x="728732" y="2141875"/>
+            <a:off x="364366" y="173927"/>
             <a:ext cx="11463268" cy="1036679"/>
           </a:xfrm>
         </p:spPr>
@@ -6761,7 +7258,7 @@
             </p:nvSpPr>
             <p:spPr>
               <a:xfrm>
-                <a:off x="1470991" y="3478696"/>
+                <a:off x="1331843" y="1690688"/>
                 <a:ext cx="9084366" cy="953210"/>
               </a:xfrm>
               <a:prstGeom prst="rect">
@@ -7057,7 +7554,7 @@
             </p:nvSpPr>
             <p:spPr>
               <a:xfrm>
-                <a:off x="1470991" y="3478696"/>
+                <a:off x="1331843" y="1690688"/>
                 <a:ext cx="9084366" cy="953210"/>
               </a:xfrm>
               <a:prstGeom prst="rect">
@@ -7085,6 +7582,499 @@
           </p:sp>
         </mc:Fallback>
       </mc:AlternateContent>
+      <p:sp>
+        <p:nvSpPr>
+          <p:cNvPr id="5" name="TextBox 4"/>
+          <p:cNvSpPr txBox="1"/>
+          <p:nvPr/>
+        </p:nvSpPr>
+        <p:spPr>
+          <a:xfrm>
+            <a:off x="178904" y="2782957"/>
+            <a:ext cx="12013096" cy="2308324"/>
+          </a:xfrm>
+          <a:prstGeom prst="rect">
+            <a:avLst/>
+          </a:prstGeom>
+          <a:noFill/>
+        </p:spPr>
+        <p:txBody>
+          <a:bodyPr wrap="square" rtlCol="0">
+            <a:spAutoFit/>
+          </a:bodyPr>
+          <a:lstStyle/>
+          <a:p>
+            <a:r>
+              <a:rPr lang="en-US" dirty="0"/>
+              <a:t>There are several </a:t>
+            </a:r>
+            <a:r>
+              <a:rPr lang="en-US" dirty="0" err="1"/>
+              <a:t>builtin</a:t>
+            </a:r>
+            <a:r>
+              <a:rPr lang="en-US" dirty="0"/>
+              <a:t> operations, we haven't mentioned up to now because the typing rules are trivial. We simply unify with the preset type signature of the operation.</a:t>
+            </a:r>
+          </a:p>
+          <a:p>
+            <a:r>
+              <a:rPr lang="en-US" dirty="0"/>
+              <a:t>Op</a:t>
+            </a:r>
+            <a:r>
+              <a:rPr lang="en-US" dirty="0"/>
+              <a:t> op e1 e2 </a:t>
+            </a:r>
+            <a:r>
+              <a:rPr lang="en-US" dirty="0"/>
+              <a:t>-&gt;</a:t>
+            </a:r>
+            <a:r>
+              <a:rPr lang="en-US" dirty="0"/>
+              <a:t> </a:t>
+            </a:r>
+            <a:r>
+              <a:rPr lang="en-US" b="1" dirty="0"/>
+              <a:t>do</a:t>
+            </a:r>
+            <a:r>
+              <a:rPr lang="en-US" dirty="0"/>
+              <a:t> (s1, t1) </a:t>
+            </a:r>
+            <a:r>
+              <a:rPr lang="en-US" dirty="0"/>
+              <a:t>&lt;-</a:t>
+            </a:r>
+            <a:r>
+              <a:rPr lang="en-US" dirty="0"/>
+              <a:t> infer </a:t>
+            </a:r>
+            <a:r>
+              <a:rPr lang="en-US" dirty="0" err="1"/>
+              <a:t>env</a:t>
+            </a:r>
+            <a:r>
+              <a:rPr lang="en-US" dirty="0"/>
+              <a:t> e1 (s2, t2) </a:t>
+            </a:r>
+            <a:r>
+              <a:rPr lang="en-US" dirty="0"/>
+              <a:t>&lt;-</a:t>
+            </a:r>
+            <a:r>
+              <a:rPr lang="en-US" dirty="0"/>
+              <a:t> infer </a:t>
+            </a:r>
+            <a:r>
+              <a:rPr lang="en-US" dirty="0" err="1"/>
+              <a:t>env</a:t>
+            </a:r>
+            <a:r>
+              <a:rPr lang="en-US" dirty="0"/>
+              <a:t> e2 </a:t>
+            </a:r>
+            <a:r>
+              <a:rPr lang="en-US" dirty="0" err="1"/>
+              <a:t>tv</a:t>
+            </a:r>
+            <a:r>
+              <a:rPr lang="en-US" dirty="0"/>
+              <a:t> </a:t>
+            </a:r>
+            <a:r>
+              <a:rPr lang="en-US" dirty="0"/>
+              <a:t>&lt;-</a:t>
+            </a:r>
+            <a:r>
+              <a:rPr lang="en-US" dirty="0"/>
+              <a:t> fresh s3 </a:t>
+            </a:r>
+            <a:r>
+              <a:rPr lang="en-US" dirty="0"/>
+              <a:t>&lt;-</a:t>
+            </a:r>
+            <a:r>
+              <a:rPr lang="en-US" dirty="0"/>
+              <a:t> unify (</a:t>
+            </a:r>
+            <a:r>
+              <a:rPr lang="en-US" dirty="0" err="1"/>
+              <a:t>TArr</a:t>
+            </a:r>
+            <a:r>
+              <a:rPr lang="en-US" dirty="0"/>
+              <a:t> t1 (</a:t>
+            </a:r>
+            <a:r>
+              <a:rPr lang="en-US" dirty="0" err="1"/>
+              <a:t>TArr</a:t>
+            </a:r>
+            <a:r>
+              <a:rPr lang="en-US" dirty="0"/>
+              <a:t> t2 </a:t>
+            </a:r>
+            <a:r>
+              <a:rPr lang="en-US" dirty="0" err="1"/>
+              <a:t>tv</a:t>
+            </a:r>
+            <a:r>
+              <a:rPr lang="en-US" dirty="0"/>
+              <a:t>)) (ops </a:t>
+            </a:r>
+            <a:r>
+              <a:rPr lang="en-US" dirty="0"/>
+              <a:t>Map.!</a:t>
+            </a:r>
+            <a:r>
+              <a:rPr lang="en-US" dirty="0"/>
+              <a:t> op) return (s1 </a:t>
+            </a:r>
+            <a:r>
+              <a:rPr lang="en-US" dirty="0"/>
+              <a:t>`compose`</a:t>
+            </a:r>
+            <a:r>
+              <a:rPr lang="en-US" dirty="0"/>
+              <a:t> s2 </a:t>
+            </a:r>
+            <a:r>
+              <a:rPr lang="en-US" dirty="0"/>
+              <a:t>`compose`</a:t>
+            </a:r>
+            <a:r>
+              <a:rPr lang="en-US" dirty="0"/>
+              <a:t> s3, apply s3 </a:t>
+            </a:r>
+            <a:r>
+              <a:rPr lang="en-US" dirty="0" err="1"/>
+              <a:t>tv</a:t>
+            </a:r>
+            <a:r>
+              <a:rPr lang="en-US" dirty="0"/>
+              <a:t>)</a:t>
+            </a:r>
+            <a:r>
+              <a:rPr lang="en-US" dirty="0"/>
+              <a:t>ops ::</a:t>
+            </a:r>
+            <a:r>
+              <a:rPr lang="en-US" dirty="0"/>
+              <a:t> </a:t>
+            </a:r>
+            <a:r>
+              <a:rPr lang="en-US" dirty="0" err="1"/>
+              <a:t>Map.Map</a:t>
+            </a:r>
+            <a:r>
+              <a:rPr lang="en-US" dirty="0"/>
+              <a:t> </a:t>
+            </a:r>
+            <a:r>
+              <a:rPr lang="en-US" dirty="0" err="1"/>
+              <a:t>Binop</a:t>
+            </a:r>
+            <a:r>
+              <a:rPr lang="en-US" dirty="0"/>
+              <a:t> </a:t>
+            </a:r>
+            <a:r>
+              <a:rPr lang="en-US" dirty="0"/>
+              <a:t>Type</a:t>
+            </a:r>
+            <a:r>
+              <a:rPr lang="en-US" dirty="0"/>
+              <a:t> ops </a:t>
+            </a:r>
+            <a:r>
+              <a:rPr lang="en-US" dirty="0"/>
+              <a:t>=</a:t>
+            </a:r>
+            <a:r>
+              <a:rPr lang="en-US" dirty="0"/>
+              <a:t> </a:t>
+            </a:r>
+            <a:r>
+              <a:rPr lang="en-US" dirty="0" err="1"/>
+              <a:t>Map.fromList</a:t>
+            </a:r>
+            <a:r>
+              <a:rPr lang="en-US" dirty="0"/>
+              <a:t> [ (</a:t>
+            </a:r>
+            <a:r>
+              <a:rPr lang="en-US" dirty="0"/>
+              <a:t>Add</a:t>
+            </a:r>
+            <a:r>
+              <a:rPr lang="en-US" dirty="0"/>
+              <a:t>, (</a:t>
+            </a:r>
+            <a:r>
+              <a:rPr lang="en-US" dirty="0" err="1"/>
+              <a:t>typeInt</a:t>
+            </a:r>
+            <a:r>
+              <a:rPr lang="en-US" dirty="0"/>
+              <a:t> </a:t>
+            </a:r>
+            <a:r>
+              <a:rPr lang="en-US" dirty="0"/>
+              <a:t>`</a:t>
+            </a:r>
+            <a:r>
+              <a:rPr lang="en-US" dirty="0" err="1"/>
+              <a:t>TArr</a:t>
+            </a:r>
+            <a:r>
+              <a:rPr lang="en-US" dirty="0"/>
+              <a:t>`</a:t>
+            </a:r>
+            <a:r>
+              <a:rPr lang="en-US" dirty="0"/>
+              <a:t> (</a:t>
+            </a:r>
+            <a:r>
+              <a:rPr lang="en-US" dirty="0" err="1"/>
+              <a:t>typeInt</a:t>
+            </a:r>
+            <a:r>
+              <a:rPr lang="en-US" dirty="0"/>
+              <a:t> </a:t>
+            </a:r>
+            <a:r>
+              <a:rPr lang="en-US" dirty="0"/>
+              <a:t>`</a:t>
+            </a:r>
+            <a:r>
+              <a:rPr lang="en-US" dirty="0" err="1"/>
+              <a:t>TArr</a:t>
+            </a:r>
+            <a:r>
+              <a:rPr lang="en-US" dirty="0"/>
+              <a:t>`</a:t>
+            </a:r>
+            <a:r>
+              <a:rPr lang="en-US" dirty="0"/>
+              <a:t> </a:t>
+            </a:r>
+            <a:r>
+              <a:rPr lang="en-US" dirty="0" err="1"/>
+              <a:t>typeInt</a:t>
+            </a:r>
+            <a:r>
+              <a:rPr lang="en-US" dirty="0"/>
+              <a:t>))) , (</a:t>
+            </a:r>
+            <a:r>
+              <a:rPr lang="en-US" dirty="0" err="1"/>
+              <a:t>Mul</a:t>
+            </a:r>
+            <a:r>
+              <a:rPr lang="en-US" dirty="0"/>
+              <a:t>, (</a:t>
+            </a:r>
+            <a:r>
+              <a:rPr lang="en-US" dirty="0" err="1"/>
+              <a:t>typeInt</a:t>
+            </a:r>
+            <a:r>
+              <a:rPr lang="en-US" dirty="0"/>
+              <a:t> </a:t>
+            </a:r>
+            <a:r>
+              <a:rPr lang="en-US" dirty="0"/>
+              <a:t>`</a:t>
+            </a:r>
+            <a:r>
+              <a:rPr lang="en-US" dirty="0" err="1"/>
+              <a:t>TArr</a:t>
+            </a:r>
+            <a:r>
+              <a:rPr lang="en-US" dirty="0"/>
+              <a:t>`</a:t>
+            </a:r>
+            <a:r>
+              <a:rPr lang="en-US" dirty="0"/>
+              <a:t> (</a:t>
+            </a:r>
+            <a:r>
+              <a:rPr lang="en-US" dirty="0" err="1"/>
+              <a:t>typeInt</a:t>
+            </a:r>
+            <a:r>
+              <a:rPr lang="en-US" dirty="0"/>
+              <a:t> </a:t>
+            </a:r>
+            <a:r>
+              <a:rPr lang="en-US" dirty="0"/>
+              <a:t>`</a:t>
+            </a:r>
+            <a:r>
+              <a:rPr lang="en-US" dirty="0" err="1"/>
+              <a:t>TArr</a:t>
+            </a:r>
+            <a:r>
+              <a:rPr lang="en-US" dirty="0"/>
+              <a:t>`</a:t>
+            </a:r>
+            <a:r>
+              <a:rPr lang="en-US" dirty="0"/>
+              <a:t> </a:t>
+            </a:r>
+            <a:r>
+              <a:rPr lang="en-US" dirty="0" err="1"/>
+              <a:t>typeInt</a:t>
+            </a:r>
+            <a:r>
+              <a:rPr lang="en-US" dirty="0"/>
+              <a:t>))) , (</a:t>
+            </a:r>
+            <a:r>
+              <a:rPr lang="en-US" dirty="0"/>
+              <a:t>Sub</a:t>
+            </a:r>
+            <a:r>
+              <a:rPr lang="en-US" dirty="0"/>
+              <a:t>, (</a:t>
+            </a:r>
+            <a:r>
+              <a:rPr lang="en-US" dirty="0" err="1"/>
+              <a:t>typeInt</a:t>
+            </a:r>
+            <a:r>
+              <a:rPr lang="en-US" dirty="0"/>
+              <a:t> </a:t>
+            </a:r>
+            <a:r>
+              <a:rPr lang="en-US" dirty="0"/>
+              <a:t>`</a:t>
+            </a:r>
+            <a:r>
+              <a:rPr lang="en-US" dirty="0" err="1"/>
+              <a:t>TArr</a:t>
+            </a:r>
+            <a:r>
+              <a:rPr lang="en-US" dirty="0"/>
+              <a:t>`</a:t>
+            </a:r>
+            <a:r>
+              <a:rPr lang="en-US" dirty="0"/>
+              <a:t> (</a:t>
+            </a:r>
+            <a:r>
+              <a:rPr lang="en-US" dirty="0" err="1"/>
+              <a:t>typeInt</a:t>
+            </a:r>
+            <a:r>
+              <a:rPr lang="en-US" dirty="0"/>
+              <a:t> </a:t>
+            </a:r>
+            <a:r>
+              <a:rPr lang="en-US" dirty="0"/>
+              <a:t>`</a:t>
+            </a:r>
+            <a:r>
+              <a:rPr lang="en-US" dirty="0" err="1"/>
+              <a:t>TArr</a:t>
+            </a:r>
+            <a:r>
+              <a:rPr lang="en-US" dirty="0"/>
+              <a:t>`</a:t>
+            </a:r>
+            <a:r>
+              <a:rPr lang="en-US" dirty="0"/>
+              <a:t> </a:t>
+            </a:r>
+            <a:r>
+              <a:rPr lang="en-US" dirty="0" err="1"/>
+              <a:t>typeInt</a:t>
+            </a:r>
+            <a:r>
+              <a:rPr lang="en-US" dirty="0"/>
+              <a:t>))) , (</a:t>
+            </a:r>
+            <a:r>
+              <a:rPr lang="en-US" dirty="0" err="1"/>
+              <a:t>Eql</a:t>
+            </a:r>
+            <a:r>
+              <a:rPr lang="en-US" dirty="0"/>
+              <a:t>, (</a:t>
+            </a:r>
+            <a:r>
+              <a:rPr lang="en-US" dirty="0" err="1"/>
+              <a:t>typeInt</a:t>
+            </a:r>
+            <a:r>
+              <a:rPr lang="en-US" dirty="0"/>
+              <a:t> </a:t>
+            </a:r>
+            <a:r>
+              <a:rPr lang="en-US" dirty="0"/>
+              <a:t>`</a:t>
+            </a:r>
+            <a:r>
+              <a:rPr lang="en-US" dirty="0" err="1"/>
+              <a:t>TArr</a:t>
+            </a:r>
+            <a:r>
+              <a:rPr lang="en-US" dirty="0"/>
+              <a:t>`</a:t>
+            </a:r>
+            <a:r>
+              <a:rPr lang="en-US" dirty="0"/>
+              <a:t> (</a:t>
+            </a:r>
+            <a:r>
+              <a:rPr lang="en-US" dirty="0" err="1"/>
+              <a:t>typeInt</a:t>
+            </a:r>
+            <a:r>
+              <a:rPr lang="en-US" dirty="0"/>
+              <a:t> </a:t>
+            </a:r>
+            <a:r>
+              <a:rPr lang="en-US" dirty="0"/>
+              <a:t>`</a:t>
+            </a:r>
+            <a:r>
+              <a:rPr lang="en-US" dirty="0" err="1"/>
+              <a:t>TArr</a:t>
+            </a:r>
+            <a:r>
+              <a:rPr lang="en-US" dirty="0"/>
+              <a:t>`</a:t>
+            </a:r>
+            <a:r>
+              <a:rPr lang="en-US" dirty="0"/>
+              <a:t> </a:t>
+            </a:r>
+            <a:r>
+              <a:rPr lang="en-US" dirty="0" err="1"/>
+              <a:t>typeBool</a:t>
+            </a:r>
+            <a:r>
+              <a:rPr lang="en-US" dirty="0"/>
+              <a:t>))) ]</a:t>
+            </a:r>
+            <a:r>
+              <a:rPr lang="en-US" dirty="0"/>
+              <a:t>(+)(×)(−)(=):𝙸𝚗𝚝→𝙸𝚗𝚝→𝙸𝚗𝚝:𝙸𝚗𝚝→𝙸𝚗𝚝→𝙸𝚗𝚝:𝙸𝚗𝚝→𝙸𝚗𝚝→𝙸𝚗𝚝:𝙸𝚗𝚝→𝙸𝚗𝚝→𝙱𝚘𝚘𝚕</a:t>
+            </a:r>
+          </a:p>
+          <a:p>
+            <a:r>
+              <a:rPr lang="en-US" dirty="0"/>
+              <a:t/>
+            </a:r>
+            <a:br>
+              <a:rPr lang="en-US" dirty="0"/>
+            </a:br>
+            <a:endParaRPr lang="en-US" dirty="0"/>
+          </a:p>
+        </p:txBody>
+      </p:sp>
     </p:spTree>
     <p:extLst>
       <p:ext uri="{BB962C8B-B14F-4D97-AF65-F5344CB8AC3E}">
@@ -7460,7 +8450,7 @@
         </p:blipFill>
         <p:spPr>
           <a:xfrm>
-            <a:off x="54457" y="2365513"/>
+            <a:off x="0" y="0"/>
             <a:ext cx="12137543" cy="1287635"/>
           </a:xfrm>
         </p:spPr>
@@ -7475,7 +8465,7 @@
             </p:nvSpPr>
             <p:spPr>
               <a:xfrm>
-                <a:off x="1928191" y="3796748"/>
+                <a:off x="1822174" y="1540639"/>
                 <a:ext cx="8547652" cy="1030347"/>
               </a:xfrm>
               <a:prstGeom prst="rect">
@@ -7941,7 +8931,7 @@
             </p:nvSpPr>
             <p:spPr>
               <a:xfrm>
-                <a:off x="1928191" y="3796748"/>
+                <a:off x="1822174" y="1540639"/>
                 <a:ext cx="8547652" cy="1030347"/>
               </a:xfrm>
               <a:prstGeom prst="rect">
@@ -7969,6 +8959,179 @@
           </p:sp>
         </mc:Fallback>
       </mc:AlternateContent>
+      <p:sp>
+        <p:nvSpPr>
+          <p:cNvPr id="5" name="TextBox 4"/>
+          <p:cNvSpPr txBox="1"/>
+          <p:nvPr/>
+        </p:nvSpPr>
+        <p:spPr>
+          <a:xfrm>
+            <a:off x="238539" y="2663687"/>
+            <a:ext cx="11899004" cy="1754326"/>
+          </a:xfrm>
+          <a:prstGeom prst="rect">
+            <a:avLst/>
+          </a:prstGeom>
+          <a:noFill/>
+        </p:spPr>
+        <p:txBody>
+          <a:bodyPr wrap="square" rtlCol="0">
+            <a:spAutoFit/>
+          </a:bodyPr>
+          <a:lstStyle/>
+          <a:p>
+            <a:r>
+              <a:rPr lang="en-US" dirty="0"/>
+              <a:t>As mentioned previously, let will be generalized so we will create a local typing environment for the body of the let expression and add the generalized inferred type let bound value to the typing environment of the body.</a:t>
+            </a:r>
+          </a:p>
+          <a:p>
+            <a:r>
+              <a:rPr lang="en-US" dirty="0"/>
+              <a:t>Let</a:t>
+            </a:r>
+            <a:r>
+              <a:rPr lang="en-US" dirty="0"/>
+              <a:t> x e1 e2 </a:t>
+            </a:r>
+            <a:r>
+              <a:rPr lang="en-US" dirty="0"/>
+              <a:t>-&gt;</a:t>
+            </a:r>
+            <a:r>
+              <a:rPr lang="en-US" dirty="0"/>
+              <a:t> </a:t>
+            </a:r>
+            <a:r>
+              <a:rPr lang="en-US" b="1" dirty="0"/>
+              <a:t>do</a:t>
+            </a:r>
+            <a:r>
+              <a:rPr lang="en-US" dirty="0"/>
+              <a:t> (s1, t1) </a:t>
+            </a:r>
+            <a:r>
+              <a:rPr lang="en-US" dirty="0"/>
+              <a:t>&lt;-</a:t>
+            </a:r>
+            <a:r>
+              <a:rPr lang="en-US" dirty="0"/>
+              <a:t> infer </a:t>
+            </a:r>
+            <a:r>
+              <a:rPr lang="en-US" dirty="0" err="1"/>
+              <a:t>env</a:t>
+            </a:r>
+            <a:r>
+              <a:rPr lang="en-US" dirty="0"/>
+              <a:t> e1 </a:t>
+            </a:r>
+            <a:r>
+              <a:rPr lang="en-US" b="1" dirty="0"/>
+              <a:t>let</a:t>
+            </a:r>
+            <a:r>
+              <a:rPr lang="en-US" dirty="0"/>
+              <a:t> </a:t>
+            </a:r>
+            <a:r>
+              <a:rPr lang="en-US" dirty="0" err="1"/>
+              <a:t>env</a:t>
+            </a:r>
+            <a:r>
+              <a:rPr lang="en-US" dirty="0"/>
+              <a:t>' </a:t>
+            </a:r>
+            <a:r>
+              <a:rPr lang="en-US" dirty="0"/>
+              <a:t>=</a:t>
+            </a:r>
+            <a:r>
+              <a:rPr lang="en-US" dirty="0"/>
+              <a:t> apply s1 </a:t>
+            </a:r>
+            <a:r>
+              <a:rPr lang="en-US" dirty="0" err="1"/>
+              <a:t>env</a:t>
+            </a:r>
+            <a:r>
+              <a:rPr lang="en-US" dirty="0"/>
+              <a:t> t' </a:t>
+            </a:r>
+            <a:r>
+              <a:rPr lang="en-US" dirty="0"/>
+              <a:t>=</a:t>
+            </a:r>
+            <a:r>
+              <a:rPr lang="en-US" dirty="0"/>
+              <a:t> generalize </a:t>
+            </a:r>
+            <a:r>
+              <a:rPr lang="en-US" dirty="0" err="1"/>
+              <a:t>env</a:t>
+            </a:r>
+            <a:r>
+              <a:rPr lang="en-US" dirty="0"/>
+              <a:t>' t1 (s2, t2) </a:t>
+            </a:r>
+            <a:r>
+              <a:rPr lang="en-US" dirty="0"/>
+              <a:t>&lt;-</a:t>
+            </a:r>
+            <a:r>
+              <a:rPr lang="en-US" dirty="0"/>
+              <a:t> infer (</a:t>
+            </a:r>
+            <a:r>
+              <a:rPr lang="en-US" dirty="0" err="1"/>
+              <a:t>env</a:t>
+            </a:r>
+            <a:r>
+              <a:rPr lang="en-US" dirty="0"/>
+              <a:t>' </a:t>
+            </a:r>
+            <a:r>
+              <a:rPr lang="en-US" dirty="0"/>
+              <a:t>`extend`</a:t>
+            </a:r>
+            <a:r>
+              <a:rPr lang="en-US" dirty="0"/>
+              <a:t> (x, t')) e2 return (s1 </a:t>
+            </a:r>
+            <a:r>
+              <a:rPr lang="en-US" dirty="0"/>
+              <a:t>`compose`</a:t>
+            </a:r>
+            <a:r>
+              <a:rPr lang="en-US" dirty="0"/>
+              <a:t> s2, t2)</a:t>
+            </a:r>
+            <a:r>
+              <a:rPr lang="en-US" dirty="0"/>
+              <a:t>Γ⊢e1:σΓ,x:σ⊢e2:τΓ⊢𝚕𝚎𝚝 x=e1 𝚒𝚗 e2:τ(</a:t>
+            </a:r>
+            <a:r>
+              <a:rPr lang="en-US" b="1" dirty="0"/>
+              <a:t>T-Let</a:t>
+            </a:r>
+            <a:r>
+              <a:rPr lang="en-US" dirty="0"/>
+              <a:t>)</a:t>
+            </a:r>
+          </a:p>
+          <a:p>
+            <a:r>
+              <a:rPr lang="en-US" dirty="0"/>
+              <a:t/>
+            </a:r>
+            <a:br>
+              <a:rPr lang="en-US" dirty="0"/>
+            </a:br>
+            <a:endParaRPr lang="en-US" dirty="0"/>
+          </a:p>
+        </p:txBody>
+      </p:sp>
     </p:spTree>
     <p:extLst>
       <p:ext uri="{BB962C8B-B14F-4D97-AF65-F5344CB8AC3E}">
@@ -8436,7 +9599,7 @@
           <a:p>
             <a:r>
               <a:rPr lang="en-US" dirty="0" smtClean="0"/>
-              <a:t>Proof of Completeness</a:t>
+              <a:t>Proof of Soundness</a:t>
             </a:r>
             <a:endParaRPr lang="en-US" dirty="0"/>
           </a:p>
@@ -8454,9 +9617,593 @@
         </p:nvSpPr>
         <p:spPr/>
         <p:txBody>
-          <a:bodyPr/>
-          <a:lstStyle/>
-          <a:p>
+          <a:bodyPr>
+            <a:normAutofit fontScale="40000" lnSpcReduction="20000"/>
+          </a:bodyPr>
+          <a:lstStyle/>
+          <a:p>
+            <a:r>
+              <a:rPr lang="en-US" dirty="0"/>
+              <a:t>Theorem 6 (Soundness) If A, C `BU e: </a:t>
+            </a:r>
+            <a:r>
+              <a:rPr lang="en-US" dirty="0" err="1"/>
+              <a:t>τ</a:t>
+            </a:r>
+            <a:r>
+              <a:rPr lang="en-US" dirty="0"/>
+              <a:t> , then for all </a:t>
+            </a:r>
+            <a:r>
+              <a:rPr lang="en-US" dirty="0" err="1"/>
+              <a:t>Γ</a:t>
+            </a:r>
+            <a:r>
+              <a:rPr lang="en-US" dirty="0"/>
+              <a:t> and S such that • </a:t>
+            </a:r>
+            <a:r>
+              <a:rPr lang="en-US" dirty="0" err="1"/>
+              <a:t>dom</a:t>
+            </a:r>
+            <a:r>
+              <a:rPr lang="en-US" dirty="0"/>
+              <a:t>(A) ⊆ </a:t>
+            </a:r>
+            <a:r>
+              <a:rPr lang="en-US" dirty="0" err="1"/>
+              <a:t>dom</a:t>
+            </a:r>
+            <a:r>
+              <a:rPr lang="en-US" dirty="0"/>
+              <a:t>(</a:t>
+            </a:r>
+            <a:r>
+              <a:rPr lang="en-US" dirty="0" err="1"/>
+              <a:t>Γ</a:t>
+            </a:r>
+            <a:r>
+              <a:rPr lang="en-US" dirty="0"/>
+              <a:t>) • S satisfies C • S satisfies A ¹ </a:t>
+            </a:r>
+            <a:r>
+              <a:rPr lang="en-US" dirty="0" err="1"/>
+              <a:t>Γ</a:t>
+            </a:r>
+            <a:r>
+              <a:rPr lang="en-US" dirty="0"/>
+              <a:t> it holds that SΓ `HM </a:t>
+            </a:r>
+            <a:r>
+              <a:rPr lang="en-US" dirty="0" err="1"/>
+              <a:t>e:Sτ</a:t>
+            </a:r>
+            <a:r>
+              <a:rPr lang="en-US" dirty="0"/>
+              <a:t> . Proof A judgement A, C `BU e: </a:t>
+            </a:r>
+            <a:r>
+              <a:rPr lang="en-US" dirty="0" err="1"/>
+              <a:t>τ</a:t>
+            </a:r>
+            <a:r>
+              <a:rPr lang="en-US" dirty="0"/>
+              <a:t> can be found by applying the Bottom-Up rules to any expression e, including ill-typed expressions. The assumption set A contains one </a:t>
+            </a:r>
+            <a:r>
+              <a:rPr lang="en-US" dirty="0" err="1"/>
+              <a:t>variabletype</a:t>
+            </a:r>
+            <a:r>
+              <a:rPr lang="en-US" dirty="0"/>
+              <a:t> pair for each free occurrence of a variable in e. Consequently, a type environment </a:t>
+            </a:r>
+            <a:r>
+              <a:rPr lang="en-US" dirty="0" err="1"/>
+              <a:t>Γ</a:t>
+            </a:r>
+            <a:r>
+              <a:rPr lang="en-US" dirty="0"/>
+              <a:t> should provide a type for each variable present in A. This is ensured by the condition </a:t>
+            </a:r>
+            <a:r>
+              <a:rPr lang="en-US" dirty="0" err="1"/>
+              <a:t>dom</a:t>
+            </a:r>
+            <a:r>
+              <a:rPr lang="en-US" dirty="0"/>
+              <a:t>(A) ⊆ </a:t>
+            </a:r>
+            <a:r>
+              <a:rPr lang="en-US" dirty="0" err="1"/>
+              <a:t>dom</a:t>
+            </a:r>
+            <a:r>
+              <a:rPr lang="en-US" dirty="0"/>
+              <a:t>(</a:t>
+            </a:r>
+            <a:r>
+              <a:rPr lang="en-US" dirty="0" err="1"/>
+              <a:t>Γ</a:t>
+            </a:r>
+            <a:r>
+              <a:rPr lang="en-US" dirty="0"/>
+              <a:t>). The condition S satisfies C should be obvious: we can only expect a typing according to the </a:t>
+            </a:r>
+            <a:r>
+              <a:rPr lang="en-US" dirty="0" err="1"/>
+              <a:t>Hindley</a:t>
+            </a:r>
+            <a:r>
+              <a:rPr lang="en-US" dirty="0"/>
+              <a:t>-Milner rules if the collected constraints are satisfied. The third constraint ensures that the variables present in A have obtained a type (to be found in S) that is consistent with the types in the type environment </a:t>
+            </a:r>
+            <a:r>
+              <a:rPr lang="en-US" dirty="0" err="1"/>
+              <a:t>Γ</a:t>
+            </a:r>
+            <a:r>
+              <a:rPr lang="en-US" dirty="0"/>
+              <a:t>. This condition restricts the combinations of S and </a:t>
+            </a:r>
+            <a:r>
+              <a:rPr lang="en-US" dirty="0" err="1"/>
+              <a:t>Γ</a:t>
+            </a:r>
+            <a:r>
+              <a:rPr lang="en-US" dirty="0"/>
+              <a:t> for which the conclusion holds. Clearly, choosing S(τ1) = Bool while x: τ1 ∈ A and </a:t>
+            </a:r>
+            <a:r>
+              <a:rPr lang="en-US" dirty="0" err="1"/>
+              <a:t>Γ</a:t>
+            </a:r>
+            <a:r>
+              <a:rPr lang="en-US" dirty="0"/>
+              <a:t>(x) = ∀</a:t>
+            </a:r>
+            <a:r>
+              <a:rPr lang="en-US" dirty="0" err="1"/>
+              <a:t>a.a</a:t>
+            </a:r>
+            <a:r>
+              <a:rPr lang="en-US" dirty="0"/>
+              <a:t> → a is not a valid choice. The theorem can be proved by induction on the structure of the expression. The base case of the induction is a variable x, for which the judgement {x : β}, ∅ `BU e : β can be derived. The empty constraint set does not impose any restriction on the substitution. </a:t>
+            </a:r>
+            <a:r>
+              <a:rPr lang="en-US" dirty="0" err="1"/>
+              <a:t>Γ</a:t>
+            </a:r>
+            <a:r>
+              <a:rPr lang="en-US" dirty="0"/>
+              <a:t>(x) is defined because x is in the domain of the assumption set. Substitution S should satisfy {x : β} ¹ </a:t>
+            </a:r>
+            <a:r>
+              <a:rPr lang="en-US" dirty="0" err="1"/>
+              <a:t>Γ</a:t>
+            </a:r>
+            <a:r>
+              <a:rPr lang="en-US" dirty="0"/>
+              <a:t>, which implies that Sβ is a generic instance of SΓ(x). As a result, judgement SΓ `HM </a:t>
+            </a:r>
+            <a:r>
+              <a:rPr lang="en-US" dirty="0" err="1"/>
+              <a:t>x:S</a:t>
+            </a:r>
+            <a:r>
+              <a:rPr lang="en-US" dirty="0"/>
+              <a:t>β is derivable. The inductive cases are application, lambda abstraction, and let-expressions. For a subexpression e1, the induction hypothesis states that there are an A1, C1, and τ1, such that A1, C1 `BU e1 : τ1 is valid. In other words, a subexpression e1 can always be decorated with an assumption set, a constraint set, and a type, using the Bottom-Up rules. Secondly, the induction hypothesis expresses that for all pairs (S, </a:t>
+            </a:r>
+            <a:r>
+              <a:rPr lang="en-US" dirty="0" err="1"/>
+              <a:t>Γ</a:t>
+            </a:r>
+            <a:r>
+              <a:rPr lang="en-US" dirty="0"/>
+              <a:t>) that meet the three condition imposed by the theorem, the type Sτ1 can be derived with the </a:t>
+            </a:r>
+            <a:r>
+              <a:rPr lang="en-US" dirty="0" err="1"/>
+              <a:t>Hindley</a:t>
+            </a:r>
+            <a:r>
+              <a:rPr lang="en-US" dirty="0"/>
+              <a:t>-Milner inference </a:t>
+            </a:r>
+            <a:r>
+              <a:rPr lang="en-US" dirty="0" smtClean="0"/>
+              <a:t>rules</a:t>
+            </a:r>
+          </a:p>
+          <a:p>
+            <a:r>
+              <a:rPr lang="en-US" dirty="0"/>
+              <a:t>for expression e1 in type environment SΓ. The strategy to construct a proof for the three remaining inductive cases is as follows. Firstly, introduce an arbitrary substitution S, together with a type environment </a:t>
+            </a:r>
+            <a:r>
+              <a:rPr lang="en-US" dirty="0" err="1"/>
+              <a:t>Γ</a:t>
+            </a:r>
+            <a:r>
+              <a:rPr lang="en-US" dirty="0"/>
+              <a:t>, for which we assume that the three conditions hold. Secondly, fulfil the conditions for each of the subexpressions, where the same substitution is used, but possibly a different type environment. Some planning is required to choose the right </a:t>
+            </a:r>
+            <a:r>
+              <a:rPr lang="en-US" dirty="0" err="1"/>
+              <a:t>Γ</a:t>
+            </a:r>
+            <a:r>
+              <a:rPr lang="en-US" dirty="0"/>
+              <a:t>. By now, a </a:t>
+            </a:r>
+            <a:r>
+              <a:rPr lang="en-US" dirty="0" err="1"/>
+              <a:t>Hindley</a:t>
+            </a:r>
+            <a:r>
+              <a:rPr lang="en-US" dirty="0"/>
+              <a:t>-Milner judgement is obtained for each subexpression. Thirdly, combine the judgements and apply the corresponding </a:t>
+            </a:r>
+            <a:r>
+              <a:rPr lang="en-US" dirty="0" err="1"/>
+              <a:t>Hindley</a:t>
+            </a:r>
+            <a:r>
+              <a:rPr lang="en-US" dirty="0"/>
+              <a:t>-Milner inference rule to get the desired judgement. If the expression at hand is a function e1 applied to an argument e2, we can assume that A1, C1 `BU e1 : τ1 and A2, C2 `BU e2 : τ2. It follows from [App]BU that A, C `BU e1 e2 : </a:t>
+            </a:r>
+            <a:r>
+              <a:rPr lang="en-US" dirty="0" err="1"/>
+              <a:t>τ</a:t>
+            </a:r>
+            <a:r>
+              <a:rPr lang="en-US" dirty="0"/>
+              <a:t> holds, where A is A1∪A2, C is C1∪ C2∪ {τ1 ≡ τ2 → β}, and </a:t>
+            </a:r>
+            <a:r>
+              <a:rPr lang="en-US" dirty="0" err="1"/>
+              <a:t>τ</a:t>
+            </a:r>
+            <a:r>
+              <a:rPr lang="en-US" dirty="0"/>
+              <a:t> is β. Consider each substitution S and each type environment </a:t>
+            </a:r>
+            <a:r>
+              <a:rPr lang="en-US" dirty="0" err="1"/>
+              <a:t>Γ</a:t>
+            </a:r>
+            <a:r>
+              <a:rPr lang="en-US" dirty="0"/>
+              <a:t> such that S satisfies C∪A¹ </a:t>
+            </a:r>
+            <a:r>
+              <a:rPr lang="en-US" dirty="0" err="1"/>
+              <a:t>Γ</a:t>
+            </a:r>
+            <a:r>
+              <a:rPr lang="en-US" dirty="0"/>
+              <a:t> and </a:t>
+            </a:r>
+            <a:r>
+              <a:rPr lang="en-US" dirty="0" err="1"/>
+              <a:t>dom</a:t>
+            </a:r>
+            <a:r>
+              <a:rPr lang="en-US" dirty="0"/>
+              <a:t>(A) ⊆ </a:t>
+            </a:r>
+            <a:r>
+              <a:rPr lang="en-US" dirty="0" err="1"/>
+              <a:t>dom</a:t>
+            </a:r>
+            <a:r>
+              <a:rPr lang="en-US" dirty="0"/>
+              <a:t>(</a:t>
+            </a:r>
+            <a:r>
+              <a:rPr lang="en-US" dirty="0" err="1"/>
+              <a:t>Γ</a:t>
+            </a:r>
+            <a:r>
+              <a:rPr lang="en-US" dirty="0"/>
+              <a:t>). In general it is true that if S satisfies C, then S also satisfies each subset of C. As a result, S satisfies C1 ∪ (A1 ¹ </a:t>
+            </a:r>
+            <a:r>
+              <a:rPr lang="en-US" dirty="0" err="1"/>
+              <a:t>Γ</a:t>
+            </a:r>
+            <a:r>
+              <a:rPr lang="en-US" dirty="0"/>
+              <a:t>). In addition </a:t>
+            </a:r>
+            <a:r>
+              <a:rPr lang="en-US" dirty="0" err="1"/>
+              <a:t>dom</a:t>
+            </a:r>
+            <a:r>
+              <a:rPr lang="en-US" dirty="0"/>
+              <a:t>(A1) ⊆ </a:t>
+            </a:r>
+            <a:r>
+              <a:rPr lang="en-US" dirty="0" err="1"/>
+              <a:t>dom</a:t>
+            </a:r>
+            <a:r>
+              <a:rPr lang="en-US" dirty="0"/>
+              <a:t>(</a:t>
+            </a:r>
+            <a:r>
+              <a:rPr lang="en-US" dirty="0" err="1"/>
+              <a:t>Γ</a:t>
+            </a:r>
+            <a:r>
+              <a:rPr lang="en-US" dirty="0"/>
+              <a:t>), and therefore by induction we acquire the judgement SΓ `HM e1 :Sτ1. In a similar way SΓ `HM e2 :Sτ2 can be obtained. Since S must satisfy the constraint τ1 ≡ τ2 → β, Sτ1 is syntactically equal to Sτ2 → Sβ. From this observation we conclude that SΓ `HM e1 e2 :Sβ holds, which completes the proof in case the expression is an application. Decorating the body of a lambda abstraction with the bottom-up algorithm results in the judgement A, C `BU e : </a:t>
+            </a:r>
+            <a:r>
+              <a:rPr lang="en-US" dirty="0" err="1"/>
+              <a:t>τ</a:t>
+            </a:r>
+            <a:r>
+              <a:rPr lang="en-US" dirty="0"/>
+              <a:t> . Applying the appropriate rule justifies A\x, C0 `BU </a:t>
+            </a:r>
+            <a:r>
+              <a:rPr lang="en-US" dirty="0" err="1"/>
+              <a:t>λx</a:t>
+            </a:r>
+            <a:r>
+              <a:rPr lang="en-US" dirty="0"/>
+              <a:t> → e : β → </a:t>
+            </a:r>
+            <a:r>
+              <a:rPr lang="en-US" dirty="0" err="1"/>
+              <a:t>τ</a:t>
+            </a:r>
+            <a:r>
+              <a:rPr lang="en-US" dirty="0"/>
+              <a:t> , where C0 is C∪{</a:t>
+            </a:r>
+            <a:r>
+              <a:rPr lang="en-US" dirty="0" err="1"/>
+              <a:t>τ</a:t>
+            </a:r>
+            <a:r>
+              <a:rPr lang="en-US" dirty="0"/>
+              <a:t> 0 ≡ β | x : </a:t>
+            </a:r>
+            <a:r>
+              <a:rPr lang="en-US" dirty="0" err="1"/>
+              <a:t>τ</a:t>
+            </a:r>
+            <a:r>
+              <a:rPr lang="en-US" dirty="0"/>
+              <a:t> 0 ∈ A}. We consider each S and </a:t>
+            </a:r>
+            <a:r>
+              <a:rPr lang="en-US" dirty="0" err="1"/>
+              <a:t>Γ</a:t>
+            </a:r>
+            <a:r>
+              <a:rPr lang="en-US" dirty="0"/>
+              <a:t> such that </a:t>
+            </a:r>
+            <a:r>
+              <a:rPr lang="en-US" dirty="0" err="1"/>
+              <a:t>dom</a:t>
+            </a:r>
+            <a:r>
+              <a:rPr lang="en-US" dirty="0"/>
+              <a:t>(A\x) ⊆ </a:t>
+            </a:r>
+            <a:r>
+              <a:rPr lang="en-US" dirty="0" err="1"/>
+              <a:t>dom</a:t>
+            </a:r>
+            <a:r>
+              <a:rPr lang="en-US" dirty="0"/>
+              <a:t>(</a:t>
+            </a:r>
+            <a:r>
+              <a:rPr lang="en-US" dirty="0" err="1"/>
+              <a:t>Γ</a:t>
+            </a:r>
+            <a:r>
+              <a:rPr lang="en-US" dirty="0"/>
+              <a:t>) and S satisfies C0 ∪ A\x ¹ </a:t>
+            </a:r>
+            <a:r>
+              <a:rPr lang="en-US" dirty="0" err="1"/>
+              <a:t>Γ</a:t>
+            </a:r>
+            <a:r>
+              <a:rPr lang="en-US" dirty="0"/>
+              <a:t>. The first assumption about </a:t>
+            </a:r>
+            <a:r>
+              <a:rPr lang="en-US" dirty="0" err="1"/>
+              <a:t>Γ</a:t>
+            </a:r>
+            <a:r>
+              <a:rPr lang="en-US" dirty="0"/>
+              <a:t> implies that also </a:t>
+            </a:r>
+            <a:r>
+              <a:rPr lang="en-US" dirty="0" err="1"/>
+              <a:t>dom</a:t>
+            </a:r>
+            <a:r>
+              <a:rPr lang="en-US" dirty="0"/>
+              <a:t>(A) ⊆ </a:t>
+            </a:r>
+            <a:r>
+              <a:rPr lang="en-US" dirty="0" err="1"/>
+              <a:t>dom</a:t>
+            </a:r>
+            <a:r>
+              <a:rPr lang="en-US" dirty="0"/>
+              <a:t>(</a:t>
+            </a:r>
+            <a:r>
+              <a:rPr lang="en-US" dirty="0" err="1"/>
+              <a:t>Γ</a:t>
+            </a:r>
+            <a:r>
+              <a:rPr lang="en-US" dirty="0"/>
+              <a:t>\x ∪ {x : </a:t>
+            </a:r>
+            <a:r>
+              <a:rPr lang="en-US" dirty="0" err="1"/>
+              <a:t>τ</a:t>
+            </a:r>
+            <a:r>
+              <a:rPr lang="en-US" dirty="0"/>
+              <a:t>}) holds. Because S satisfies the constraints {</a:t>
+            </a:r>
+            <a:r>
+              <a:rPr lang="en-US" dirty="0" err="1"/>
+              <a:t>τ</a:t>
+            </a:r>
+            <a:r>
+              <a:rPr lang="en-US" dirty="0"/>
+              <a:t> 0 ≡ β | x : </a:t>
+            </a:r>
+            <a:r>
+              <a:rPr lang="en-US" dirty="0" err="1"/>
+              <a:t>τ</a:t>
+            </a:r>
+            <a:r>
+              <a:rPr lang="en-US" dirty="0"/>
+              <a:t> 0 ∈ A}, the types associated with x in A are all equivalent after applying the substitution. In other words, the types that were introduced at the variables, which are bound by the lambda abstraction, are unified. S also satisfies A¹{x : β}, since τ1 ¹ τ2 (notice the monomorphic type on the right) is equal to τ1 ≡ τ2. Merging two environments as in Property (5) yields that A ¹ </a:t>
+            </a:r>
+            <a:r>
+              <a:rPr lang="en-US" dirty="0" err="1"/>
+              <a:t>Γ</a:t>
+            </a:r>
+            <a:r>
+              <a:rPr lang="en-US" dirty="0"/>
+              <a:t>\x ∪ {x : β} is satisfied by S. By induction we get S(</a:t>
+            </a:r>
+            <a:r>
+              <a:rPr lang="en-US" dirty="0" err="1"/>
+              <a:t>Γ</a:t>
+            </a:r>
+            <a:r>
+              <a:rPr lang="en-US" dirty="0"/>
+              <a:t>\x ∪ {x:β}) `HM </a:t>
+            </a:r>
+            <a:r>
+              <a:rPr lang="en-US" dirty="0" err="1"/>
+              <a:t>e:Sτ</a:t>
+            </a:r>
+            <a:r>
+              <a:rPr lang="en-US" dirty="0"/>
+              <a:t> , which implies SΓ `HM </a:t>
+            </a:r>
+            <a:r>
+              <a:rPr lang="en-US" dirty="0" err="1"/>
+              <a:t>λx</a:t>
+            </a:r>
+            <a:r>
+              <a:rPr lang="en-US" dirty="0"/>
+              <a:t> → </a:t>
+            </a:r>
+            <a:r>
+              <a:rPr lang="en-US" dirty="0" err="1"/>
+              <a:t>e:S</a:t>
+            </a:r>
+            <a:r>
+              <a:rPr lang="en-US" dirty="0"/>
+              <a:t>(β → </a:t>
+            </a:r>
+            <a:r>
+              <a:rPr lang="en-US" dirty="0" err="1"/>
+              <a:t>τ</a:t>
+            </a:r>
+            <a:r>
+              <a:rPr lang="en-US" dirty="0"/>
+              <a:t> ). The judgement A, C `BU let x = e1 in e2 : τ2 can be inferred, where A is A1 ∪ A2\x, C is C1 ∪ C2 ∪ {</a:t>
+            </a:r>
+            <a:r>
+              <a:rPr lang="en-US" dirty="0" err="1"/>
+              <a:t>τ</a:t>
+            </a:r>
+            <a:r>
+              <a:rPr lang="en-US" dirty="0"/>
+              <a:t> 0 ≤M τ1 | x : </a:t>
+            </a:r>
+            <a:r>
+              <a:rPr lang="en-US" dirty="0" err="1"/>
+              <a:t>τ</a:t>
+            </a:r>
+            <a:r>
+              <a:rPr lang="en-US" dirty="0"/>
+              <a:t> 0 ∈ A2}, and assuming the declaration and the body of the let-expression to have judgements A1, C1 `BU e1 : τ1 and A2, C2 `BU e2 : τ2 respectively. Consider all substitutions S and all type environments </a:t>
+            </a:r>
+            <a:r>
+              <a:rPr lang="en-US" dirty="0" err="1"/>
+              <a:t>Γ</a:t>
+            </a:r>
+            <a:r>
+              <a:rPr lang="en-US" dirty="0"/>
+              <a:t> that fulfil the three conditions. By induction we get SΓ `HM e1 :Sτ1. The essential step to prove the let-rule sound is to observe that S satisfies A2 ¹ {</a:t>
+            </a:r>
+            <a:r>
+              <a:rPr lang="en-US" dirty="0" err="1"/>
+              <a:t>x:generalize</a:t>
+            </a:r>
+            <a:r>
+              <a:rPr lang="en-US" dirty="0"/>
+              <a:t>(SΓ, Sτ1)}. This holds because S satisfies C, and because, according to Lemma 5, generalizing type τ1 with respect to the free type variables in SΓ is the same as generalization with respect to the free type variables in SM. By induction we get S(</a:t>
+            </a:r>
+            <a:r>
+              <a:rPr lang="en-US" dirty="0" err="1"/>
+              <a:t>Γ</a:t>
+            </a:r>
+            <a:r>
+              <a:rPr lang="en-US" dirty="0"/>
+              <a:t>\x∪ {</a:t>
+            </a:r>
+            <a:r>
+              <a:rPr lang="en-US" dirty="0" err="1"/>
+              <a:t>x:generalize</a:t>
+            </a:r>
+            <a:r>
+              <a:rPr lang="en-US" dirty="0"/>
+              <a:t>(SΓ, τ1)}) `HM e2 :Sτ2, from which SΓ `HM let x = e1 in e2 :Sτ2 can be concluded. ✷ We have shown that every </a:t>
+            </a:r>
+            <a:r>
+              <a:rPr lang="en-US" dirty="0" err="1"/>
+              <a:t>satisfiable</a:t>
+            </a:r>
+            <a:r>
+              <a:rPr lang="en-US" dirty="0"/>
+              <a:t> constraint set implies the existence of a </a:t>
+            </a:r>
+            <a:r>
+              <a:rPr lang="en-US" dirty="0" err="1"/>
+              <a:t>HindleyMilner</a:t>
+            </a:r>
+            <a:r>
+              <a:rPr lang="en-US" dirty="0"/>
+              <a:t> derivation with the same result type. We now turn to the complementary result where we prove the completeness of our method: if there is a successful </a:t>
+            </a:r>
+            <a:r>
+              <a:rPr lang="en-US" dirty="0" err="1"/>
+              <a:t>Hindley</a:t>
+            </a:r>
+            <a:r>
+              <a:rPr lang="en-US" dirty="0"/>
+              <a:t>-Milner derivation, then our method will infer a type that is at least as general as the type derived using the </a:t>
+            </a:r>
+            <a:r>
+              <a:rPr lang="en-US" dirty="0" err="1"/>
+              <a:t>Hindley</a:t>
+            </a:r>
+            <a:r>
+              <a:rPr lang="en-US" dirty="0"/>
+              <a:t>-Milner rules. In Appendix B we present a more detailed proof of this theorem.</a:t>
+            </a:r>
             <a:endParaRPr lang="en-US" dirty="0"/>
           </a:p>
         </p:txBody>
@@ -8464,7 +10211,7 @@
     </p:spTree>
     <p:extLst>
       <p:ext uri="{BB962C8B-B14F-4D97-AF65-F5344CB8AC3E}">
-        <p14:creationId xmlns:p14="http://schemas.microsoft.com/office/powerpoint/2010/main" val="750992418"/>
+        <p14:creationId xmlns:p14="http://schemas.microsoft.com/office/powerpoint/2010/main" val="1872664589"/>
       </p:ext>
     </p:extLst>
   </p:cSld>
@@ -8508,7 +10255,7 @@
           <a:p>
             <a:r>
               <a:rPr lang="en-US" dirty="0" smtClean="0"/>
-              <a:t>Proof of Soundness</a:t>
+              <a:t>Proof of Completeness</a:t>
             </a:r>
             <a:endParaRPr lang="en-US" dirty="0"/>
           </a:p>
@@ -8526,17 +10273,385 @@
         </p:nvSpPr>
         <p:spPr/>
         <p:txBody>
-          <a:bodyPr/>
-          <a:lstStyle/>
-          <a:p>
-            <a:endParaRPr lang="en-US"/>
+          <a:bodyPr>
+            <a:normAutofit fontScale="55000" lnSpcReduction="20000"/>
+          </a:bodyPr>
+          <a:lstStyle/>
+          <a:p>
+            <a:r>
+              <a:rPr lang="en-US" dirty="0"/>
+              <a:t>Theorem 7 (Completeness) If </a:t>
+            </a:r>
+            <a:r>
+              <a:rPr lang="en-US" dirty="0" err="1"/>
+              <a:t>Γ</a:t>
+            </a:r>
+            <a:r>
+              <a:rPr lang="en-US" dirty="0"/>
+              <a:t> `HM e : </a:t>
+            </a:r>
+            <a:r>
+              <a:rPr lang="en-US" dirty="0" err="1"/>
+              <a:t>τ</a:t>
+            </a:r>
+            <a:r>
+              <a:rPr lang="en-US" dirty="0"/>
+              <a:t> then A, C `BU e : </a:t>
+            </a:r>
+            <a:r>
+              <a:rPr lang="en-US" dirty="0" err="1"/>
+              <a:t>τ</a:t>
+            </a:r>
+            <a:r>
+              <a:rPr lang="en-US" dirty="0"/>
+              <a:t> 0 and there exists an S such that • S satisfies C • S satisfies A ¹ </a:t>
+            </a:r>
+            <a:r>
+              <a:rPr lang="en-US" dirty="0" err="1"/>
+              <a:t>Γ</a:t>
+            </a:r>
+            <a:r>
+              <a:rPr lang="en-US" dirty="0"/>
+              <a:t> • </a:t>
+            </a:r>
+            <a:r>
+              <a:rPr lang="en-US" dirty="0" err="1"/>
+              <a:t>Sτ</a:t>
+            </a:r>
+            <a:r>
+              <a:rPr lang="en-US" dirty="0"/>
+              <a:t> = </a:t>
+            </a:r>
+            <a:r>
+              <a:rPr lang="en-US" dirty="0" err="1"/>
+              <a:t>Sτ</a:t>
+            </a:r>
+            <a:r>
+              <a:rPr lang="en-US" dirty="0"/>
+              <a:t> 0 Proof Consider the collection of well-typed expressions under a type environment </a:t>
+            </a:r>
+            <a:r>
+              <a:rPr lang="en-US" dirty="0" err="1"/>
+              <a:t>Γ</a:t>
+            </a:r>
+            <a:r>
+              <a:rPr lang="en-US" dirty="0"/>
+              <a:t>. For such an expression e, we can construct a derivation tree, where the type </a:t>
+            </a:r>
+            <a:r>
+              <a:rPr lang="en-US" dirty="0" err="1"/>
+              <a:t>τ</a:t>
+            </a:r>
+            <a:r>
+              <a:rPr lang="en-US" dirty="0"/>
+              <a:t> in the root of the tree is an instance of the (unique) principle type scheme for the expression. Decorating the expression according to the Bottom-Up rules, we obtain the judgement A, C `BU e : </a:t>
+            </a:r>
+            <a:r>
+              <a:rPr lang="en-US" dirty="0" err="1"/>
+              <a:t>τ</a:t>
+            </a:r>
+            <a:r>
+              <a:rPr lang="en-US" dirty="0"/>
+              <a:t> 0 for some </a:t>
+            </a:r>
+            <a:r>
+              <a:rPr lang="en-US" dirty="0" err="1"/>
+              <a:t>τ</a:t>
+            </a:r>
+            <a:r>
+              <a:rPr lang="en-US" dirty="0"/>
+              <a:t> 0 . The types </a:t>
+            </a:r>
+            <a:r>
+              <a:rPr lang="en-US" dirty="0" err="1"/>
+              <a:t>τ</a:t>
+            </a:r>
+            <a:r>
+              <a:rPr lang="en-US" dirty="0"/>
+              <a:t> and </a:t>
+            </a:r>
+            <a:r>
+              <a:rPr lang="en-US" dirty="0" err="1"/>
+              <a:t>τ</a:t>
+            </a:r>
+            <a:r>
+              <a:rPr lang="en-US" dirty="0"/>
+              <a:t> 0 are independent; </a:t>
+            </a:r>
+            <a:r>
+              <a:rPr lang="en-US" dirty="0" err="1"/>
+              <a:t>τ</a:t>
+            </a:r>
+            <a:r>
+              <a:rPr lang="en-US" dirty="0"/>
+              <a:t> is derived with </a:t>
+            </a:r>
+            <a:r>
+              <a:rPr lang="en-US" dirty="0" err="1"/>
+              <a:t>Hindley</a:t>
+            </a:r>
+            <a:r>
+              <a:rPr lang="en-US" dirty="0"/>
+              <a:t>-Milner, whereas a substitution that satisfies each constraint in C still has to be applied to </a:t>
+            </a:r>
+            <a:r>
+              <a:rPr lang="en-US" dirty="0" err="1"/>
+              <a:t>τ</a:t>
+            </a:r>
+            <a:r>
+              <a:rPr lang="en-US" dirty="0"/>
+              <a:t> 0 . In our proof, the substitution S also bridges the gap between the fact that </a:t>
+            </a:r>
+            <a:r>
+              <a:rPr lang="en-US" dirty="0" err="1"/>
+              <a:t>Sτ</a:t>
+            </a:r>
+            <a:r>
+              <a:rPr lang="en-US" dirty="0"/>
+              <a:t> 0 is the principal type scheme of e, whereas this is not necessarily the case for </a:t>
+            </a:r>
+            <a:r>
+              <a:rPr lang="en-US" dirty="0" err="1"/>
+              <a:t>τ</a:t>
+            </a:r>
+            <a:r>
+              <a:rPr lang="en-US" dirty="0"/>
+              <a:t> in the </a:t>
+            </a:r>
+            <a:r>
+              <a:rPr lang="en-US" dirty="0" err="1"/>
+              <a:t>Hindley</a:t>
+            </a:r>
+            <a:r>
+              <a:rPr lang="en-US" dirty="0"/>
+              <a:t>-Milner derivation. The proof proceeds by induction on the structure of the expressions. Our induction hypothesis is somewhat stronger than the statement of the theorem. The condition that S satisfies A ¹ </a:t>
+            </a:r>
+            <a:r>
+              <a:rPr lang="en-US" dirty="0" err="1"/>
+              <a:t>Γ</a:t>
+            </a:r>
+            <a:r>
+              <a:rPr lang="en-US" dirty="0"/>
+              <a:t> is in fact [ ] satisfies (SA) ¹ </a:t>
+            </a:r>
+            <a:r>
+              <a:rPr lang="en-US" dirty="0" err="1"/>
+              <a:t>Γ</a:t>
+            </a:r>
+            <a:r>
+              <a:rPr lang="en-US" dirty="0"/>
+              <a:t>, in other words, S is not allowed to modify </a:t>
+            </a:r>
+            <a:r>
+              <a:rPr lang="en-US" dirty="0" err="1"/>
+              <a:t>Γ</a:t>
+            </a:r>
+            <a:r>
+              <a:rPr lang="en-US" dirty="0"/>
+              <a:t>. The third condition similarly becomes </a:t>
+            </a:r>
+            <a:r>
+              <a:rPr lang="en-US" dirty="0" err="1"/>
+              <a:t>τ</a:t>
+            </a:r>
+            <a:r>
+              <a:rPr lang="en-US" dirty="0"/>
+              <a:t> = </a:t>
+            </a:r>
+            <a:r>
+              <a:rPr lang="en-US" dirty="0" err="1"/>
+              <a:t>Sτ</a:t>
+            </a:r>
+            <a:r>
+              <a:rPr lang="en-US" dirty="0"/>
+              <a:t> 0 . This simplifies the proof. If the expression is a single variable x, then the substitution that satisfies the three conditions can be constructed in a straightforward way. Choose S to be [β 7→ </a:t>
+            </a:r>
+            <a:r>
+              <a:rPr lang="en-US" dirty="0" err="1"/>
+              <a:t>τ</a:t>
+            </a:r>
+            <a:r>
+              <a:rPr lang="en-US" dirty="0"/>
+              <a:t> ], where β is the fresh type variable assigned to x by the Bottom-Up rules, and </a:t>
+            </a:r>
+            <a:r>
+              <a:rPr lang="en-US" dirty="0" err="1"/>
+              <a:t>τ</a:t>
+            </a:r>
+            <a:r>
+              <a:rPr lang="en-US" dirty="0"/>
+              <a:t> is the type that is returned by the </a:t>
+            </a:r>
+            <a:r>
+              <a:rPr lang="en-US" dirty="0" err="1"/>
+              <a:t>Hindley</a:t>
+            </a:r>
+            <a:r>
+              <a:rPr lang="en-US" dirty="0"/>
+              <a:t>-Milner rules, and which therefore is an instance of the type scheme that is provided by </a:t>
+            </a:r>
+            <a:r>
+              <a:rPr lang="en-US" dirty="0" err="1"/>
+              <a:t>Γ</a:t>
+            </a:r>
+            <a:r>
+              <a:rPr lang="en-US" dirty="0"/>
+              <a:t> for x. Clearly, S satisfies the empty constraint set, S satisfies {x:β} ¹ </a:t>
+            </a:r>
+            <a:r>
+              <a:rPr lang="en-US" dirty="0" err="1"/>
+              <a:t>Γ</a:t>
+            </a:r>
+            <a:r>
+              <a:rPr lang="en-US" dirty="0"/>
+              <a:t>, and Sβ = </a:t>
+            </a:r>
+            <a:r>
+              <a:rPr lang="en-US" dirty="0" err="1"/>
+              <a:t>τ</a:t>
+            </a:r>
+            <a:r>
+              <a:rPr lang="en-US" dirty="0"/>
+              <a:t> . A substitution for an application is constructed by composing the substitutions of the two subexpressions, and additionally map the fresh type variable β to the range of the function type that was derived for the function expression. The domains of the substitutions are independent because the type variables mentioned in the two subtrees are disjoint. The fresh type variable β in the Bottom-Up rule for lambda abstractions is used to unify several type variables that were assigned to the occurrences of the abstracted variable in the scope of the lambda. Substitution S maps this type variable to the type τ1, which was assigned to the variable x and used to extend </a:t>
+            </a:r>
+            <a:r>
+              <a:rPr lang="en-US" dirty="0" err="1"/>
+              <a:t>Γ</a:t>
+            </a:r>
+            <a:r>
+              <a:rPr lang="en-US" dirty="0"/>
+              <a:t>. For the other type variables we will use the substitution obtained by induction. Because S satisfies A¹{x : τ1}, S also satisfies {</a:t>
+            </a:r>
+            <a:r>
+              <a:rPr lang="en-US" dirty="0" err="1"/>
+              <a:t>τ</a:t>
+            </a:r>
+            <a:r>
+              <a:rPr lang="en-US" dirty="0"/>
+              <a:t> 0 ≡ β | x: </a:t>
+            </a:r>
+            <a:r>
+              <a:rPr lang="en-US" dirty="0" err="1"/>
+              <a:t>τ</a:t>
+            </a:r>
+            <a:r>
+              <a:rPr lang="en-US" dirty="0"/>
+              <a:t> 0 ∈ A}. It is sufficient to combine the two substitutions that can be obtained from the declaration and the body, also because no fresh type variables are introduced. The only interesting condition to verify for this composed substitution S is to check whether S satisfies the created implicit instance constraints. The induction hypothesis results in S satisfies A2 ¹ {x : generalize(</a:t>
+            </a:r>
+            <a:r>
+              <a:rPr lang="en-US" dirty="0" err="1"/>
+              <a:t>Γ</a:t>
+            </a:r>
+            <a:r>
+              <a:rPr lang="en-US" dirty="0"/>
+              <a:t>, τ1)} for the body, and </a:t>
+            </a:r>
+            <a:r>
+              <a:rPr lang="en-US" dirty="0" err="1"/>
+              <a:t>Sτ</a:t>
+            </a:r>
+            <a:r>
+              <a:rPr lang="en-US" dirty="0"/>
+              <a:t> 0 1 = τ1 for the declaration. Because generalizing over SΓ and SM is equivalent (Lemma 5), we get that S satisfies {</a:t>
+            </a:r>
+            <a:r>
+              <a:rPr lang="en-US" dirty="0" err="1"/>
+              <a:t>τ</a:t>
+            </a:r>
+            <a:r>
+              <a:rPr lang="en-US" dirty="0"/>
+              <a:t> 0 ¹ generalize(SM, </a:t>
+            </a:r>
+            <a:r>
+              <a:rPr lang="en-US" dirty="0" err="1"/>
+              <a:t>Sτ</a:t>
+            </a:r>
+            <a:r>
+              <a:rPr lang="en-US" dirty="0"/>
+              <a:t> 0 1) | x: </a:t>
+            </a:r>
+            <a:r>
+              <a:rPr lang="en-US" dirty="0" err="1"/>
+              <a:t>τ</a:t>
+            </a:r>
+            <a:r>
+              <a:rPr lang="en-US" dirty="0"/>
+              <a:t> 0 ∈ A2}. Applying Property (3) results in satisfaction of {</a:t>
+            </a:r>
+            <a:r>
+              <a:rPr lang="en-US" dirty="0" err="1"/>
+              <a:t>τ</a:t>
+            </a:r>
+            <a:r>
+              <a:rPr lang="en-US" dirty="0"/>
+              <a:t> 0 ≤M </a:t>
+            </a:r>
+            <a:r>
+              <a:rPr lang="en-US" dirty="0" err="1"/>
+              <a:t>τ</a:t>
+            </a:r>
+            <a:r>
+              <a:rPr lang="en-US" dirty="0"/>
+              <a:t> 0 1 | x: </a:t>
+            </a:r>
+            <a:r>
+              <a:rPr lang="en-US" dirty="0" err="1"/>
+              <a:t>τ</a:t>
+            </a:r>
+            <a:r>
+              <a:rPr lang="en-US" dirty="0"/>
+              <a:t> 0 ∈ A2} by S. We conclude that if </a:t>
+            </a:r>
+            <a:r>
+              <a:rPr lang="en-US" dirty="0" err="1"/>
+              <a:t>Γ</a:t>
+            </a:r>
+            <a:r>
+              <a:rPr lang="en-US" dirty="0"/>
+              <a:t> `HM e : </a:t>
+            </a:r>
+            <a:r>
+              <a:rPr lang="en-US" dirty="0" err="1"/>
+              <a:t>τ</a:t>
+            </a:r>
+            <a:r>
+              <a:rPr lang="en-US" dirty="0"/>
+              <a:t> is derivable, then </a:t>
+            </a:r>
+            <a:r>
+              <a:rPr lang="en-US" dirty="0" err="1"/>
+              <a:t>InferType</a:t>
+            </a:r>
+            <a:r>
+              <a:rPr lang="en-US" dirty="0"/>
+              <a:t>(</a:t>
+            </a:r>
+            <a:r>
+              <a:rPr lang="en-US" dirty="0" err="1"/>
+              <a:t>Γ</a:t>
+            </a:r>
+            <a:r>
+              <a:rPr lang="en-US" dirty="0"/>
+              <a:t>, e) returns the most general type for expression e under type environment </a:t>
+            </a:r>
+            <a:r>
+              <a:rPr lang="en-US" dirty="0" err="1"/>
+              <a:t>Γ</a:t>
+            </a:r>
+            <a:r>
+              <a:rPr lang="en-US" dirty="0" smtClean="0"/>
+              <a:t>.</a:t>
+            </a:r>
+          </a:p>
+          <a:p>
+            <a:endParaRPr lang="en-US" dirty="0"/>
           </a:p>
         </p:txBody>
       </p:sp>
     </p:spTree>
     <p:extLst>
       <p:ext uri="{BB962C8B-B14F-4D97-AF65-F5344CB8AC3E}">
-        <p14:creationId xmlns:p14="http://schemas.microsoft.com/office/powerpoint/2010/main" val="1872664589"/>
+        <p14:creationId xmlns:p14="http://schemas.microsoft.com/office/powerpoint/2010/main" val="750992418"/>
       </p:ext>
     </p:extLst>
   </p:cSld>
@@ -10664,24 +12779,70 @@
           </a:xfrm>
         </p:spPr>
         <p:txBody>
-          <a:bodyPr/>
-          <a:lstStyle/>
-          <a:p>
+          <a:bodyPr>
+            <a:normAutofit fontScale="70000" lnSpcReduction="20000"/>
+          </a:bodyPr>
+          <a:lstStyle/>
+          <a:p>
+            <a:r>
+              <a:rPr lang="en-US" dirty="0" smtClean="0">
+                <a:solidFill>
+                  <a:schemeClr val="bg1"/>
+                </a:solidFill>
+              </a:rPr>
+              <a:t>Milner</a:t>
+            </a:r>
             <a:r>
               <a:rPr lang="en-US" dirty="0">
                 <a:solidFill>
                   <a:schemeClr val="bg1"/>
                 </a:solidFill>
               </a:rPr>
-              <a:t>Kimberly Knight, “Media Epidemics: Viral Structures in Literature and New Media” PhD diss., University of California, Santa Barbara, 2011, MLA </a:t>
-            </a:r>
+              <a:t>, Robin (1978). "A Theory of Type Polymorphism in Programming". Journal of Computer and System Sciences. 17 (3): 348–374. </a:t>
+            </a:r>
+            <a:r>
+              <a:rPr lang="en-US" dirty="0" err="1">
+                <a:solidFill>
+                  <a:schemeClr val="bg1"/>
+                </a:solidFill>
+              </a:rPr>
+              <a:t>CiteSeerX</a:t>
+            </a:r>
+            <a:r>
+              <a:rPr lang="en-US" dirty="0">
+                <a:solidFill>
+                  <a:schemeClr val="bg1"/>
+                </a:solidFill>
+              </a:rPr>
+              <a:t> 10.1.1.67.5276. doi:10.1016/0022-0000(78)90014-4</a:t>
+            </a:r>
+          </a:p>
+          <a:p>
+            <a:r>
+              <a:rPr lang="en-US" dirty="0" err="1" smtClean="0">
+                <a:solidFill>
+                  <a:schemeClr val="bg1"/>
+                </a:solidFill>
+              </a:rPr>
+              <a:t>Damas</a:t>
+            </a:r>
+            <a:r>
+              <a:rPr lang="en-US" dirty="0">
+                <a:solidFill>
+                  <a:schemeClr val="bg1"/>
+                </a:solidFill>
+              </a:rPr>
+              <a:t>, Luis; Milner, Robin (1982). Principal type-schemes for functional programs (PDF). 9th Symposium on Principles of programming languages (POPL'82). ACM. pp. 207–212.</a:t>
+            </a:r>
+          </a:p>
+          <a:p>
             <a:r>
               <a:rPr lang="en-US" dirty="0" smtClean="0">
                 <a:solidFill>
                   <a:schemeClr val="bg1"/>
                 </a:solidFill>
               </a:rPr>
-              <a:t>International </a:t>
+              <a:t>J</a:t>
             </a:r>
             <a:r>
               <a:rPr lang="en-US" dirty="0">
@@ -10689,25 +12850,49 @@
                   <a:schemeClr val="bg1"/>
                 </a:solidFill>
               </a:rPr>
-              <a:t>Bibliography (2013420395</a:t>
-            </a:r>
+              <a:t>. B. Wells. "</a:t>
+            </a:r>
+            <a:r>
+              <a:rPr lang="en-US" dirty="0" err="1">
+                <a:solidFill>
+                  <a:schemeClr val="bg1"/>
+                </a:solidFill>
+              </a:rPr>
+              <a:t>Typability</a:t>
+            </a:r>
+            <a:r>
+              <a:rPr lang="en-US" dirty="0">
+                <a:solidFill>
+                  <a:schemeClr val="bg1"/>
+                </a:solidFill>
+              </a:rPr>
+              <a:t> and type checking in the second-order lambda-calculus are equivalent and undecidable." In Proceedings of the 9th Annual IEEE Symposium on Logic in Computer Science (LICS), pages 176–185, 1994.</a:t>
+            </a:r>
+          </a:p>
+          <a:p>
             <a:r>
               <a:rPr lang="en-US" dirty="0" smtClean="0">
                 <a:solidFill>
                   <a:schemeClr val="bg1"/>
                 </a:solidFill>
               </a:rPr>
-              <a:t>).</a:t>
-            </a:r>
-          </a:p>
-          <a:p>
+              <a:t>Vaughan</a:t>
+            </a:r>
+            <a:r>
+              <a:rPr lang="en-US" dirty="0">
+                <a:solidFill>
+                  <a:schemeClr val="bg1"/>
+                </a:solidFill>
+              </a:rPr>
+              <a:t>, Jeff (July 23, 2008) [May 5, 2005]. "A proof of correctness for the </a:t>
+            </a:r>
             <a:r>
               <a:rPr lang="en-US" dirty="0" err="1">
                 <a:solidFill>
                   <a:schemeClr val="bg1"/>
                 </a:solidFill>
               </a:rPr>
-              <a:t>Limer</a:t>
+              <a:t>Hindley</a:t>
             </a:r>
             <a:r>
               <a:rPr lang="en-US" dirty="0">
@@ -10715,107 +12900,211 @@
                   <a:schemeClr val="bg1"/>
                 </a:solidFill>
               </a:rPr>
-              <a:t>, Eric. “Heck Yes! The First Free Wireless Plan is Finally Here.” Gizmodo. October 1, 2013. </a:t>
+              <a:t>–Milner type inference algorithm" (PDF). Archived from the original (PDF) on 2012-03-24.</a:t>
+            </a:r>
+          </a:p>
+          <a:p>
+            <a:r>
+              <a:rPr lang="en-US" dirty="0" err="1" smtClean="0">
+                <a:solidFill>
+                  <a:schemeClr val="bg1"/>
+                </a:solidFill>
+              </a:rPr>
+              <a:t>Dunfield</a:t>
             </a:r>
             <a:r>
               <a:rPr lang="en-US" dirty="0">
                 <a:solidFill>
                   <a:schemeClr val="bg1"/>
                 </a:solidFill>
-                <a:hlinkClick r:id="rId3"/>
-              </a:rPr>
-              <a:t>http://</a:t>
-            </a:r>
+              </a:rPr>
+              <a:t>, J. &amp; </a:t>
+            </a:r>
+            <a:r>
+              <a:rPr lang="en-US" dirty="0" err="1">
+                <a:solidFill>
+                  <a:schemeClr val="bg1"/>
+                </a:solidFill>
+              </a:rPr>
+              <a:t>Krishnaswami</a:t>
+            </a:r>
+            <a:r>
+              <a:rPr lang="en-US" dirty="0">
+                <a:solidFill>
+                  <a:schemeClr val="bg1"/>
+                </a:solidFill>
+              </a:rPr>
+              <a:t>, N. R. (2013) Complete and easy bidirectional </a:t>
+            </a:r>
+            <a:r>
+              <a:rPr lang="en-US" dirty="0" err="1">
+                <a:solidFill>
+                  <a:schemeClr val="bg1"/>
+                </a:solidFill>
+              </a:rPr>
+              <a:t>typechecking</a:t>
+            </a:r>
+            <a:r>
+              <a:rPr lang="en-US" dirty="0">
+                <a:solidFill>
+                  <a:schemeClr val="bg1"/>
+                </a:solidFill>
+              </a:rPr>
+              <a:t> for higher-rank polymorphism. In International Conference on Functional Programming (ICFP). </a:t>
+            </a:r>
+            <a:r>
+              <a:rPr lang="en-US" dirty="0" err="1">
+                <a:solidFill>
+                  <a:schemeClr val="bg1"/>
+                </a:solidFill>
+              </a:rPr>
+              <a:t>arXiv</a:t>
+            </a:r>
+            <a:r>
+              <a:rPr lang="en-US" dirty="0">
+                <a:solidFill>
+                  <a:schemeClr val="bg1"/>
+                </a:solidFill>
+              </a:rPr>
+              <a:t>: 1306.6032 [</a:t>
+            </a:r>
+            <a:r>
+              <a:rPr lang="en-US" dirty="0" err="1">
+                <a:solidFill>
+                  <a:schemeClr val="bg1"/>
+                </a:solidFill>
+              </a:rPr>
+              <a:t>cs.PL</a:t>
+            </a:r>
+            <a:r>
+              <a:rPr lang="en-US" dirty="0">
+                <a:solidFill>
+                  <a:schemeClr val="bg1"/>
+                </a:solidFill>
+              </a:rPr>
+              <a:t>].</a:t>
+            </a:r>
+          </a:p>
+          <a:p>
+            <a:r>
+              <a:rPr lang="en-US" dirty="0" err="1" smtClean="0">
+                <a:solidFill>
+                  <a:schemeClr val="bg1"/>
+                </a:solidFill>
+              </a:rPr>
+              <a:t>Doets</a:t>
+            </a:r>
+            <a:r>
+              <a:rPr lang="en-US" dirty="0">
+                <a:solidFill>
+                  <a:schemeClr val="bg1"/>
+                </a:solidFill>
+              </a:rPr>
+              <a:t>, </a:t>
+            </a:r>
+            <a:r>
+              <a:rPr lang="en-US" dirty="0" err="1">
+                <a:solidFill>
+                  <a:schemeClr val="bg1"/>
+                </a:solidFill>
+              </a:rPr>
+              <a:t>Kees</a:t>
+            </a:r>
+            <a:r>
+              <a:rPr lang="en-US" dirty="0">
+                <a:solidFill>
+                  <a:schemeClr val="bg1"/>
+                </a:solidFill>
+              </a:rPr>
+              <a:t> and Jan van </a:t>
+            </a:r>
+            <a:r>
+              <a:rPr lang="en-US" dirty="0" err="1">
+                <a:solidFill>
+                  <a:schemeClr val="bg1"/>
+                </a:solidFill>
+              </a:rPr>
+              <a:t>Eijk</a:t>
+            </a:r>
+            <a:r>
+              <a:rPr lang="en-US" dirty="0">
+                <a:solidFill>
+                  <a:schemeClr val="bg1"/>
+                </a:solidFill>
+              </a:rPr>
+              <a:t>, 2004, The Haskell Road to Logic, </a:t>
+            </a:r>
+            <a:r>
+              <a:rPr lang="en-US" dirty="0" err="1">
+                <a:solidFill>
+                  <a:schemeClr val="bg1"/>
+                </a:solidFill>
+              </a:rPr>
+              <a:t>Maths</a:t>
+            </a:r>
+            <a:r>
+              <a:rPr lang="en-US" dirty="0">
+                <a:solidFill>
+                  <a:schemeClr val="bg1"/>
+                </a:solidFill>
+              </a:rPr>
+              <a:t> and Programming, London: College Publications.</a:t>
+            </a:r>
+          </a:p>
+          <a:p>
             <a:r>
               <a:rPr lang="en-US" dirty="0" smtClean="0">
                 <a:solidFill>
                   <a:schemeClr val="bg1"/>
                 </a:solidFill>
-                <a:hlinkClick r:id="rId3"/>
-              </a:rPr>
-              <a:t>gizmodo.com/heck-yes-the-first-free-wireless-plan-is-finally-here-1429566597</a:t>
+              </a:rPr>
+              <a:t>Jones</a:t>
+            </a:r>
+            <a:r>
+              <a:rPr lang="en-US" dirty="0">
+                <a:solidFill>
+                  <a:schemeClr val="bg1"/>
+                </a:solidFill>
+              </a:rPr>
+              <a:t>, M. (1999). Typing Haskell in Haskell. In (Meijer, 1999). Available at ftp://</a:t>
+            </a:r>
+            <a:r>
+              <a:rPr lang="en-US" dirty="0" err="1">
+                <a:solidFill>
+                  <a:schemeClr val="bg1"/>
+                </a:solidFill>
+              </a:rPr>
+              <a:t>ftp.cs.uu.nl</a:t>
+            </a:r>
+            <a:r>
+              <a:rPr lang="en-US" dirty="0">
+                <a:solidFill>
+                  <a:schemeClr val="bg1"/>
+                </a:solidFill>
+              </a:rPr>
+              <a:t>/pub/RUU/CS/</a:t>
+            </a:r>
+            <a:r>
+              <a:rPr lang="en-US" dirty="0" err="1">
+                <a:solidFill>
+                  <a:schemeClr val="bg1"/>
+                </a:solidFill>
+              </a:rPr>
+              <a:t>techreps</a:t>
+            </a:r>
+            <a:r>
+              <a:rPr lang="en-US" dirty="0">
+                <a:solidFill>
+                  <a:schemeClr val="bg1"/>
+                </a:solidFill>
+              </a:rPr>
+              <a:t>/CS-1999/1999-28.pdf</a:t>
             </a:r>
             <a:endParaRPr lang="en-US" dirty="0" smtClean="0">
               <a:solidFill>
                 <a:schemeClr val="bg1"/>
               </a:solidFill>
             </a:endParaRPr>
-          </a:p>
-          <a:p>
-            <a:r>
-              <a:rPr lang="en-US" dirty="0">
-                <a:solidFill>
-                  <a:schemeClr val="bg1"/>
-                </a:solidFill>
-              </a:rPr>
-              <a:t>Generalizing </a:t>
-            </a:r>
-            <a:r>
-              <a:rPr lang="en-US" dirty="0" err="1">
-                <a:solidFill>
-                  <a:schemeClr val="bg1"/>
-                </a:solidFill>
-              </a:rPr>
-              <a:t>Hindley</a:t>
-            </a:r>
-            <a:r>
-              <a:rPr lang="en-US" dirty="0">
-                <a:solidFill>
-                  <a:schemeClr val="bg1"/>
-                </a:solidFill>
-              </a:rPr>
-              <a:t>-Milner Type Inference </a:t>
-            </a:r>
-            <a:r>
-              <a:rPr lang="en-US" dirty="0" smtClean="0">
-                <a:solidFill>
-                  <a:schemeClr val="bg1"/>
-                </a:solidFill>
-              </a:rPr>
-              <a:t>Algorithms</a:t>
-            </a:r>
-          </a:p>
-          <a:p>
-            <a:r>
-              <a:rPr lang="en-US" dirty="0" smtClean="0">
-                <a:solidFill>
-                  <a:schemeClr val="bg1"/>
-                </a:solidFill>
-              </a:rPr>
-              <a:t>Complete </a:t>
-            </a:r>
-            <a:r>
-              <a:rPr lang="en-US" dirty="0">
-                <a:solidFill>
-                  <a:schemeClr val="bg1"/>
-                </a:solidFill>
-              </a:rPr>
-              <a:t>and Easy Bidirectional </a:t>
-            </a:r>
-            <a:r>
-              <a:rPr lang="en-US" dirty="0" err="1">
-                <a:solidFill>
-                  <a:schemeClr val="bg1"/>
-                </a:solidFill>
-              </a:rPr>
-              <a:t>Typechecking</a:t>
-            </a:r>
-            <a:r>
-              <a:rPr lang="en-US" dirty="0">
-                <a:solidFill>
-                  <a:schemeClr val="bg1"/>
-                </a:solidFill>
-              </a:rPr>
-              <a:t> for Higher-Rank </a:t>
-            </a:r>
-            <a:r>
-              <a:rPr lang="en-US" dirty="0" smtClean="0">
-                <a:solidFill>
-                  <a:schemeClr val="bg1"/>
-                </a:solidFill>
-              </a:rPr>
-              <a:t>Polymorphism</a:t>
-            </a:r>
           </a:p>
           <a:p>
             <a:endParaRPr lang="en-US" dirty="0">
@@ -10892,6 +13181,14 @@
           <a:bodyPr/>
           <a:lstStyle/>
           <a:p>
+            <a:r>
+              <a:rPr lang="en-US" dirty="0">
+                <a:solidFill>
+                  <a:schemeClr val="bg1"/>
+                </a:solidFill>
+              </a:rPr>
+              <a:t>References</a:t>
+            </a:r>
             <a:endParaRPr lang="en-US" dirty="0"/>
           </a:p>
         </p:txBody>
@@ -10908,10 +13205,320 @@
         </p:nvSpPr>
         <p:spPr/>
         <p:txBody>
-          <a:bodyPr/>
-          <a:lstStyle/>
-          <a:p>
-            <a:endParaRPr lang="en-US"/>
+          <a:bodyPr>
+            <a:normAutofit/>
+          </a:bodyPr>
+          <a:lstStyle/>
+          <a:p>
+            <a:r>
+              <a:rPr lang="en-US" dirty="0" smtClean="0">
+                <a:solidFill>
+                  <a:schemeClr val="bg1"/>
+                </a:solidFill>
+              </a:rPr>
+              <a:t>Martin </a:t>
+            </a:r>
+            <a:r>
+              <a:rPr lang="en-US" dirty="0" err="1">
+                <a:solidFill>
+                  <a:schemeClr val="bg1"/>
+                </a:solidFill>
+              </a:rPr>
+              <a:t>Grabmüller</a:t>
+            </a:r>
+            <a:r>
+              <a:rPr lang="en-US" dirty="0">
+                <a:solidFill>
+                  <a:schemeClr val="bg1"/>
+                </a:solidFill>
+              </a:rPr>
+              <a:t>. </a:t>
+            </a:r>
+            <a:r>
+              <a:rPr lang="en-US" dirty="0">
+                <a:solidFill>
+                  <a:schemeClr val="bg1"/>
+                </a:solidFill>
+                <a:hlinkClick r:id="rId3"/>
+              </a:rPr>
+              <a:t>Algorithm W Step by </a:t>
+            </a:r>
+            <a:r>
+              <a:rPr lang="en-US" dirty="0" smtClean="0">
+                <a:solidFill>
+                  <a:schemeClr val="bg1"/>
+                </a:solidFill>
+                <a:hlinkClick r:id="rId3"/>
+              </a:rPr>
+              <a:t>Step</a:t>
+            </a:r>
+            <a:endParaRPr lang="en-US" dirty="0" smtClean="0">
+              <a:solidFill>
+                <a:schemeClr val="bg1"/>
+              </a:solidFill>
+            </a:endParaRPr>
+          </a:p>
+          <a:p>
+            <a:r>
+              <a:rPr lang="en-US" dirty="0">
+                <a:solidFill>
+                  <a:schemeClr val="bg1"/>
+                </a:solidFill>
+              </a:rPr>
+              <a:t>Gödel, K., 1931, “</a:t>
+            </a:r>
+            <a:r>
+              <a:rPr lang="en-US" dirty="0" err="1">
+                <a:solidFill>
+                  <a:schemeClr val="bg1"/>
+                </a:solidFill>
+              </a:rPr>
+              <a:t>Über</a:t>
+            </a:r>
+            <a:r>
+              <a:rPr lang="en-US" dirty="0">
+                <a:solidFill>
+                  <a:schemeClr val="bg1"/>
+                </a:solidFill>
+              </a:rPr>
+              <a:t> formal </a:t>
+            </a:r>
+            <a:r>
+              <a:rPr lang="en-US" dirty="0" err="1">
+                <a:solidFill>
+                  <a:schemeClr val="bg1"/>
+                </a:solidFill>
+              </a:rPr>
+              <a:t>unentscheidbare</a:t>
+            </a:r>
+            <a:r>
+              <a:rPr lang="en-US" dirty="0">
+                <a:solidFill>
+                  <a:schemeClr val="bg1"/>
+                </a:solidFill>
+              </a:rPr>
+              <a:t> </a:t>
+            </a:r>
+            <a:r>
+              <a:rPr lang="en-US" dirty="0" err="1">
+                <a:solidFill>
+                  <a:schemeClr val="bg1"/>
+                </a:solidFill>
+              </a:rPr>
+              <a:t>Sätze</a:t>
+            </a:r>
+            <a:r>
+              <a:rPr lang="en-US" dirty="0">
+                <a:solidFill>
+                  <a:schemeClr val="bg1"/>
+                </a:solidFill>
+              </a:rPr>
+              <a:t> der Principia Mathematica und </a:t>
+            </a:r>
+            <a:r>
+              <a:rPr lang="en-US" dirty="0" err="1">
+                <a:solidFill>
+                  <a:schemeClr val="bg1"/>
+                </a:solidFill>
+              </a:rPr>
+              <a:t>verwandter</a:t>
+            </a:r>
+            <a:r>
+              <a:rPr lang="en-US" dirty="0">
+                <a:solidFill>
+                  <a:schemeClr val="bg1"/>
+                </a:solidFill>
+              </a:rPr>
+              <a:t> </a:t>
+            </a:r>
+            <a:r>
+              <a:rPr lang="en-US" dirty="0" err="1">
+                <a:solidFill>
+                  <a:schemeClr val="bg1"/>
+                </a:solidFill>
+              </a:rPr>
+              <a:t>Systeme</a:t>
+            </a:r>
+            <a:r>
+              <a:rPr lang="en-US" dirty="0">
+                <a:solidFill>
+                  <a:schemeClr val="bg1"/>
+                </a:solidFill>
+              </a:rPr>
+              <a:t> I,” </a:t>
+            </a:r>
+            <a:r>
+              <a:rPr lang="en-US" i="1" dirty="0" err="1">
+                <a:solidFill>
+                  <a:schemeClr val="bg1"/>
+                </a:solidFill>
+              </a:rPr>
+              <a:t>Monatshefte</a:t>
+            </a:r>
+            <a:r>
+              <a:rPr lang="en-US" i="1" dirty="0">
+                <a:solidFill>
+                  <a:schemeClr val="bg1"/>
+                </a:solidFill>
+              </a:rPr>
+              <a:t> </a:t>
+            </a:r>
+            <a:r>
+              <a:rPr lang="en-US" i="1" dirty="0" err="1">
+                <a:solidFill>
+                  <a:schemeClr val="bg1"/>
+                </a:solidFill>
+              </a:rPr>
+              <a:t>für</a:t>
+            </a:r>
+            <a:r>
+              <a:rPr lang="en-US" i="1" dirty="0">
+                <a:solidFill>
+                  <a:schemeClr val="bg1"/>
+                </a:solidFill>
+              </a:rPr>
+              <a:t> </a:t>
+            </a:r>
+            <a:r>
+              <a:rPr lang="en-US" i="1" dirty="0" err="1">
+                <a:solidFill>
+                  <a:schemeClr val="bg1"/>
+                </a:solidFill>
+              </a:rPr>
+              <a:t>Mathematik</a:t>
+            </a:r>
+            <a:r>
+              <a:rPr lang="en-US" i="1" dirty="0">
+                <a:solidFill>
+                  <a:schemeClr val="bg1"/>
+                </a:solidFill>
+              </a:rPr>
+              <a:t> </a:t>
+            </a:r>
+            <a:r>
+              <a:rPr lang="en-US" i="1" dirty="0" err="1">
+                <a:solidFill>
+                  <a:schemeClr val="bg1"/>
+                </a:solidFill>
+              </a:rPr>
+              <a:t>Physik</a:t>
+            </a:r>
+            <a:r>
+              <a:rPr lang="en-US" dirty="0">
+                <a:solidFill>
+                  <a:schemeClr val="bg1"/>
+                </a:solidFill>
+              </a:rPr>
+              <a:t>, 38: 173–198. English translation in van </a:t>
+            </a:r>
+            <a:r>
+              <a:rPr lang="en-US" dirty="0" err="1">
+                <a:solidFill>
+                  <a:schemeClr val="bg1"/>
+                </a:solidFill>
+              </a:rPr>
+              <a:t>Heijenoort</a:t>
+            </a:r>
+            <a:r>
+              <a:rPr lang="en-US" dirty="0">
+                <a:solidFill>
+                  <a:schemeClr val="bg1"/>
+                </a:solidFill>
+              </a:rPr>
+              <a:t> 1967, 596–616, and in Gödel 1986, 144–195</a:t>
+            </a:r>
+            <a:r>
+              <a:rPr lang="en-US" dirty="0" smtClean="0">
+                <a:solidFill>
+                  <a:schemeClr val="bg1"/>
+                </a:solidFill>
+              </a:rPr>
+              <a:t>.</a:t>
+            </a:r>
+          </a:p>
+          <a:p>
+            <a:r>
+              <a:rPr lang="en-US" dirty="0" smtClean="0">
+                <a:solidFill>
+                  <a:schemeClr val="bg1"/>
+                </a:solidFill>
+              </a:rPr>
+              <a:t>Turing</a:t>
+            </a:r>
+            <a:r>
+              <a:rPr lang="en-US" dirty="0">
+                <a:solidFill>
+                  <a:schemeClr val="bg1"/>
+                </a:solidFill>
+              </a:rPr>
+              <a:t>, Alan (1936). On Computable Numbers, with an Application to the </a:t>
+            </a:r>
+            <a:r>
+              <a:rPr lang="en-US" dirty="0" err="1">
+                <a:solidFill>
+                  <a:schemeClr val="bg1"/>
+                </a:solidFill>
+              </a:rPr>
+              <a:t>Entscheidungsproblem</a:t>
+            </a:r>
+            <a:r>
+              <a:rPr lang="en-US" dirty="0">
+                <a:solidFill>
+                  <a:schemeClr val="bg1"/>
+                </a:solidFill>
+              </a:rPr>
+              <a:t>. _Proceedings of the London Mathematical Society_ 42 (1):230-265. </a:t>
+            </a:r>
+            <a:endParaRPr lang="en-US" dirty="0" smtClean="0">
+              <a:solidFill>
+                <a:schemeClr val="bg1"/>
+              </a:solidFill>
+            </a:endParaRPr>
+          </a:p>
+          <a:p>
+            <a:r>
+              <a:rPr lang="en-US" dirty="0">
+                <a:solidFill>
+                  <a:schemeClr val="bg1"/>
+                </a:solidFill>
+              </a:rPr>
+              <a:t>Generalizing </a:t>
+            </a:r>
+            <a:r>
+              <a:rPr lang="en-US" dirty="0" err="1">
+                <a:solidFill>
+                  <a:schemeClr val="bg1"/>
+                </a:solidFill>
+              </a:rPr>
+              <a:t>Hindley</a:t>
+            </a:r>
+            <a:r>
+              <a:rPr lang="en-US" dirty="0">
+                <a:solidFill>
+                  <a:schemeClr val="bg1"/>
+                </a:solidFill>
+              </a:rPr>
+              <a:t>-Milner Type Inference Algorithms</a:t>
+            </a:r>
+            <a:endParaRPr lang="en-US" dirty="0" smtClean="0">
+              <a:solidFill>
+                <a:schemeClr val="bg1"/>
+              </a:solidFill>
+            </a:endParaRPr>
+          </a:p>
+          <a:p>
+            <a:endParaRPr lang="en-US" dirty="0">
+              <a:solidFill>
+                <a:schemeClr val="bg1"/>
+              </a:solidFill>
+            </a:endParaRPr>
+          </a:p>
+          <a:p>
+            <a:endParaRPr lang="en-US" dirty="0">
+              <a:solidFill>
+                <a:schemeClr val="bg1"/>
+              </a:solidFill>
+            </a:endParaRPr>
           </a:p>
         </p:txBody>
       </p:sp>

</xml_diff>